<commit_message>
Update README and replance vignette Intro to sticRs by Getting started
</commit_message>
<xml_diff>
--- a/paper/workflow.pptx
+++ b/paper/workflow.pptx
@@ -6,6 +6,7 @@
   </p:sldMasterIdLst>
   <p:sldIdLst>
     <p:sldId id="256" r:id="rId2"/>
+    <p:sldId id="257" r:id="rId3"/>
   </p:sldIdLst>
   <p:sldSz cx="9906000" cy="4140200"/>
   <p:notesSz cx="6858000" cy="9144000"/>
@@ -1925,6 +1926,753 @@
 </dgm:colorsDef>
 </file>
 
+<file path=ppt/diagrams/colors2.xml><?xml version="1.0" encoding="utf-8"?>
+<dgm:colorsDef xmlns:dgm="http://schemas.openxmlformats.org/drawingml/2006/diagram" xmlns:a="http://schemas.openxmlformats.org/drawingml/2006/main" uniqueId="urn:microsoft.com/office/officeart/2005/8/colors/accent1_2">
+  <dgm:title val=""/>
+  <dgm:desc val=""/>
+  <dgm:catLst>
+    <dgm:cat type="accent1" pri="11200"/>
+  </dgm:catLst>
+  <dgm:styleLbl name="node0">
+    <dgm:fillClrLst meth="repeat">
+      <a:schemeClr val="accent1"/>
+    </dgm:fillClrLst>
+    <dgm:linClrLst meth="repeat">
+      <a:schemeClr val="lt1"/>
+    </dgm:linClrLst>
+    <dgm:effectClrLst/>
+    <dgm:txLinClrLst/>
+    <dgm:txFillClrLst/>
+    <dgm:txEffectClrLst/>
+  </dgm:styleLbl>
+  <dgm:styleLbl name="alignNode1">
+    <dgm:fillClrLst meth="repeat">
+      <a:schemeClr val="accent1"/>
+    </dgm:fillClrLst>
+    <dgm:linClrLst meth="repeat">
+      <a:schemeClr val="accent1"/>
+    </dgm:linClrLst>
+    <dgm:effectClrLst/>
+    <dgm:txLinClrLst/>
+    <dgm:txFillClrLst/>
+    <dgm:txEffectClrLst/>
+  </dgm:styleLbl>
+  <dgm:styleLbl name="node1">
+    <dgm:fillClrLst meth="repeat">
+      <a:schemeClr val="accent1"/>
+    </dgm:fillClrLst>
+    <dgm:linClrLst meth="repeat">
+      <a:schemeClr val="lt1"/>
+    </dgm:linClrLst>
+    <dgm:effectClrLst/>
+    <dgm:txLinClrLst/>
+    <dgm:txFillClrLst/>
+    <dgm:txEffectClrLst/>
+  </dgm:styleLbl>
+  <dgm:styleLbl name="lnNode1">
+    <dgm:fillClrLst meth="repeat">
+      <a:schemeClr val="accent1"/>
+    </dgm:fillClrLst>
+    <dgm:linClrLst meth="repeat">
+      <a:schemeClr val="lt1"/>
+    </dgm:linClrLst>
+    <dgm:effectClrLst/>
+    <dgm:txLinClrLst/>
+    <dgm:txFillClrLst/>
+    <dgm:txEffectClrLst/>
+  </dgm:styleLbl>
+  <dgm:styleLbl name="vennNode1">
+    <dgm:fillClrLst meth="repeat">
+      <a:schemeClr val="accent1">
+        <a:alpha val="50000"/>
+      </a:schemeClr>
+    </dgm:fillClrLst>
+    <dgm:linClrLst meth="repeat">
+      <a:schemeClr val="lt1"/>
+    </dgm:linClrLst>
+    <dgm:effectClrLst/>
+    <dgm:txLinClrLst/>
+    <dgm:txFillClrLst/>
+    <dgm:txEffectClrLst/>
+  </dgm:styleLbl>
+  <dgm:styleLbl name="node2">
+    <dgm:fillClrLst meth="repeat">
+      <a:schemeClr val="accent1"/>
+    </dgm:fillClrLst>
+    <dgm:linClrLst meth="repeat">
+      <a:schemeClr val="lt1"/>
+    </dgm:linClrLst>
+    <dgm:effectClrLst/>
+    <dgm:txLinClrLst/>
+    <dgm:txFillClrLst/>
+    <dgm:txEffectClrLst/>
+  </dgm:styleLbl>
+  <dgm:styleLbl name="node3">
+    <dgm:fillClrLst meth="repeat">
+      <a:schemeClr val="accent1"/>
+    </dgm:fillClrLst>
+    <dgm:linClrLst meth="repeat">
+      <a:schemeClr val="lt1"/>
+    </dgm:linClrLst>
+    <dgm:effectClrLst/>
+    <dgm:txLinClrLst/>
+    <dgm:txFillClrLst/>
+    <dgm:txEffectClrLst/>
+  </dgm:styleLbl>
+  <dgm:styleLbl name="node4">
+    <dgm:fillClrLst meth="repeat">
+      <a:schemeClr val="accent1"/>
+    </dgm:fillClrLst>
+    <dgm:linClrLst meth="repeat">
+      <a:schemeClr val="lt1"/>
+    </dgm:linClrLst>
+    <dgm:effectClrLst/>
+    <dgm:txLinClrLst/>
+    <dgm:txFillClrLst/>
+    <dgm:txEffectClrLst/>
+  </dgm:styleLbl>
+  <dgm:styleLbl name="fgImgPlace1">
+    <dgm:fillClrLst meth="repeat">
+      <a:schemeClr val="accent1">
+        <a:tint val="50000"/>
+      </a:schemeClr>
+    </dgm:fillClrLst>
+    <dgm:linClrLst meth="repeat">
+      <a:schemeClr val="lt1"/>
+    </dgm:linClrLst>
+    <dgm:effectClrLst/>
+    <dgm:txLinClrLst/>
+    <dgm:txFillClrLst meth="repeat">
+      <a:schemeClr val="lt1"/>
+    </dgm:txFillClrLst>
+    <dgm:txEffectClrLst/>
+  </dgm:styleLbl>
+  <dgm:styleLbl name="alignImgPlace1">
+    <dgm:fillClrLst meth="repeat">
+      <a:schemeClr val="accent1">
+        <a:tint val="50000"/>
+      </a:schemeClr>
+    </dgm:fillClrLst>
+    <dgm:linClrLst meth="repeat">
+      <a:schemeClr val="lt1"/>
+    </dgm:linClrLst>
+    <dgm:effectClrLst/>
+    <dgm:txLinClrLst/>
+    <dgm:txFillClrLst meth="repeat">
+      <a:schemeClr val="lt1"/>
+    </dgm:txFillClrLst>
+    <dgm:txEffectClrLst/>
+  </dgm:styleLbl>
+  <dgm:styleLbl name="bgImgPlace1">
+    <dgm:fillClrLst meth="repeat">
+      <a:schemeClr val="accent1">
+        <a:tint val="50000"/>
+      </a:schemeClr>
+    </dgm:fillClrLst>
+    <dgm:linClrLst meth="repeat">
+      <a:schemeClr val="lt1"/>
+    </dgm:linClrLst>
+    <dgm:effectClrLst/>
+    <dgm:txLinClrLst/>
+    <dgm:txFillClrLst meth="repeat">
+      <a:schemeClr val="lt1"/>
+    </dgm:txFillClrLst>
+    <dgm:txEffectClrLst/>
+  </dgm:styleLbl>
+  <dgm:styleLbl name="sibTrans2D1">
+    <dgm:fillClrLst meth="repeat">
+      <a:schemeClr val="accent1">
+        <a:tint val="60000"/>
+      </a:schemeClr>
+    </dgm:fillClrLst>
+    <dgm:linClrLst meth="repeat">
+      <a:schemeClr val="accent1">
+        <a:tint val="60000"/>
+      </a:schemeClr>
+    </dgm:linClrLst>
+    <dgm:effectClrLst/>
+    <dgm:txLinClrLst/>
+    <dgm:txFillClrLst/>
+    <dgm:txEffectClrLst/>
+  </dgm:styleLbl>
+  <dgm:styleLbl name="fgSibTrans2D1">
+    <dgm:fillClrLst meth="repeat">
+      <a:schemeClr val="accent1">
+        <a:tint val="60000"/>
+      </a:schemeClr>
+    </dgm:fillClrLst>
+    <dgm:linClrLst meth="repeat">
+      <a:schemeClr val="accent1">
+        <a:tint val="60000"/>
+      </a:schemeClr>
+    </dgm:linClrLst>
+    <dgm:effectClrLst/>
+    <dgm:txLinClrLst/>
+    <dgm:txFillClrLst/>
+    <dgm:txEffectClrLst/>
+  </dgm:styleLbl>
+  <dgm:styleLbl name="bgSibTrans2D1">
+    <dgm:fillClrLst meth="repeat">
+      <a:schemeClr val="accent1">
+        <a:tint val="60000"/>
+      </a:schemeClr>
+    </dgm:fillClrLst>
+    <dgm:linClrLst meth="repeat">
+      <a:schemeClr val="accent1">
+        <a:tint val="60000"/>
+      </a:schemeClr>
+    </dgm:linClrLst>
+    <dgm:effectClrLst/>
+    <dgm:txLinClrLst/>
+    <dgm:txFillClrLst/>
+    <dgm:txEffectClrLst/>
+  </dgm:styleLbl>
+  <dgm:styleLbl name="sibTrans1D1">
+    <dgm:fillClrLst meth="repeat">
+      <a:schemeClr val="accent1"/>
+    </dgm:fillClrLst>
+    <dgm:linClrLst meth="repeat">
+      <a:schemeClr val="accent1"/>
+    </dgm:linClrLst>
+    <dgm:effectClrLst/>
+    <dgm:txLinClrLst/>
+    <dgm:txFillClrLst meth="repeat">
+      <a:schemeClr val="tx1"/>
+    </dgm:txFillClrLst>
+    <dgm:txEffectClrLst/>
+  </dgm:styleLbl>
+  <dgm:styleLbl name="callout">
+    <dgm:fillClrLst meth="repeat">
+      <a:schemeClr val="accent1"/>
+    </dgm:fillClrLst>
+    <dgm:linClrLst meth="repeat">
+      <a:schemeClr val="accent1">
+        <a:tint val="50000"/>
+      </a:schemeClr>
+    </dgm:linClrLst>
+    <dgm:effectClrLst/>
+    <dgm:txLinClrLst/>
+    <dgm:txFillClrLst meth="repeat">
+      <a:schemeClr val="tx1"/>
+    </dgm:txFillClrLst>
+    <dgm:txEffectClrLst/>
+  </dgm:styleLbl>
+  <dgm:styleLbl name="asst0">
+    <dgm:fillClrLst meth="repeat">
+      <a:schemeClr val="accent1"/>
+    </dgm:fillClrLst>
+    <dgm:linClrLst meth="repeat">
+      <a:schemeClr val="lt1"/>
+    </dgm:linClrLst>
+    <dgm:effectClrLst/>
+    <dgm:txLinClrLst/>
+    <dgm:txFillClrLst/>
+    <dgm:txEffectClrLst/>
+  </dgm:styleLbl>
+  <dgm:styleLbl name="asst1">
+    <dgm:fillClrLst meth="repeat">
+      <a:schemeClr val="accent1"/>
+    </dgm:fillClrLst>
+    <dgm:linClrLst meth="repeat">
+      <a:schemeClr val="lt1"/>
+    </dgm:linClrLst>
+    <dgm:effectClrLst/>
+    <dgm:txLinClrLst/>
+    <dgm:txFillClrLst/>
+    <dgm:txEffectClrLst/>
+  </dgm:styleLbl>
+  <dgm:styleLbl name="asst2">
+    <dgm:fillClrLst meth="repeat">
+      <a:schemeClr val="accent1"/>
+    </dgm:fillClrLst>
+    <dgm:linClrLst meth="repeat">
+      <a:schemeClr val="lt1"/>
+    </dgm:linClrLst>
+    <dgm:effectClrLst/>
+    <dgm:txLinClrLst/>
+    <dgm:txFillClrLst/>
+    <dgm:txEffectClrLst/>
+  </dgm:styleLbl>
+  <dgm:styleLbl name="asst3">
+    <dgm:fillClrLst meth="repeat">
+      <a:schemeClr val="accent1"/>
+    </dgm:fillClrLst>
+    <dgm:linClrLst meth="repeat">
+      <a:schemeClr val="lt1"/>
+    </dgm:linClrLst>
+    <dgm:effectClrLst/>
+    <dgm:txLinClrLst/>
+    <dgm:txFillClrLst/>
+    <dgm:txEffectClrLst/>
+  </dgm:styleLbl>
+  <dgm:styleLbl name="asst4">
+    <dgm:fillClrLst meth="repeat">
+      <a:schemeClr val="accent1"/>
+    </dgm:fillClrLst>
+    <dgm:linClrLst meth="repeat">
+      <a:schemeClr val="lt1"/>
+    </dgm:linClrLst>
+    <dgm:effectClrLst/>
+    <dgm:txLinClrLst/>
+    <dgm:txFillClrLst/>
+    <dgm:txEffectClrLst/>
+  </dgm:styleLbl>
+  <dgm:styleLbl name="parChTrans2D1">
+    <dgm:fillClrLst meth="repeat">
+      <a:schemeClr val="accent1">
+        <a:tint val="60000"/>
+      </a:schemeClr>
+    </dgm:fillClrLst>
+    <dgm:linClrLst meth="repeat">
+      <a:schemeClr val="accent1">
+        <a:tint val="60000"/>
+      </a:schemeClr>
+    </dgm:linClrLst>
+    <dgm:effectClrLst/>
+    <dgm:txLinClrLst/>
+    <dgm:txFillClrLst meth="repeat">
+      <a:schemeClr val="lt1"/>
+    </dgm:txFillClrLst>
+    <dgm:txEffectClrLst/>
+  </dgm:styleLbl>
+  <dgm:styleLbl name="parChTrans2D2">
+    <dgm:fillClrLst meth="repeat">
+      <a:schemeClr val="accent1"/>
+    </dgm:fillClrLst>
+    <dgm:linClrLst meth="repeat">
+      <a:schemeClr val="accent1"/>
+    </dgm:linClrLst>
+    <dgm:effectClrLst/>
+    <dgm:txLinClrLst/>
+    <dgm:txFillClrLst meth="repeat">
+      <a:schemeClr val="lt1"/>
+    </dgm:txFillClrLst>
+    <dgm:txEffectClrLst/>
+  </dgm:styleLbl>
+  <dgm:styleLbl name="parChTrans2D3">
+    <dgm:fillClrLst meth="repeat">
+      <a:schemeClr val="accent1"/>
+    </dgm:fillClrLst>
+    <dgm:linClrLst meth="repeat">
+      <a:schemeClr val="accent1"/>
+    </dgm:linClrLst>
+    <dgm:effectClrLst/>
+    <dgm:txLinClrLst/>
+    <dgm:txFillClrLst meth="repeat">
+      <a:schemeClr val="lt1"/>
+    </dgm:txFillClrLst>
+    <dgm:txEffectClrLst/>
+  </dgm:styleLbl>
+  <dgm:styleLbl name="parChTrans2D4">
+    <dgm:fillClrLst meth="repeat">
+      <a:schemeClr val="accent1"/>
+    </dgm:fillClrLst>
+    <dgm:linClrLst meth="repeat">
+      <a:schemeClr val="accent1"/>
+    </dgm:linClrLst>
+    <dgm:effectClrLst/>
+    <dgm:txLinClrLst/>
+    <dgm:txFillClrLst meth="repeat">
+      <a:schemeClr val="lt1"/>
+    </dgm:txFillClrLst>
+    <dgm:txEffectClrLst/>
+  </dgm:styleLbl>
+  <dgm:styleLbl name="parChTrans1D1">
+    <dgm:fillClrLst meth="repeat">
+      <a:schemeClr val="accent1"/>
+    </dgm:fillClrLst>
+    <dgm:linClrLst meth="repeat">
+      <a:schemeClr val="accent1">
+        <a:shade val="60000"/>
+      </a:schemeClr>
+    </dgm:linClrLst>
+    <dgm:effectClrLst/>
+    <dgm:txLinClrLst/>
+    <dgm:txFillClrLst meth="repeat">
+      <a:schemeClr val="tx1"/>
+    </dgm:txFillClrLst>
+    <dgm:txEffectClrLst/>
+  </dgm:styleLbl>
+  <dgm:styleLbl name="parChTrans1D2">
+    <dgm:fillClrLst meth="repeat">
+      <a:schemeClr val="accent1"/>
+    </dgm:fillClrLst>
+    <dgm:linClrLst meth="repeat">
+      <a:schemeClr val="accent1">
+        <a:shade val="60000"/>
+      </a:schemeClr>
+    </dgm:linClrLst>
+    <dgm:effectClrLst/>
+    <dgm:txLinClrLst/>
+    <dgm:txFillClrLst meth="repeat">
+      <a:schemeClr val="tx1"/>
+    </dgm:txFillClrLst>
+    <dgm:txEffectClrLst/>
+  </dgm:styleLbl>
+  <dgm:styleLbl name="parChTrans1D3">
+    <dgm:fillClrLst meth="repeat">
+      <a:schemeClr val="accent1"/>
+    </dgm:fillClrLst>
+    <dgm:linClrLst meth="repeat">
+      <a:schemeClr val="accent1">
+        <a:shade val="80000"/>
+      </a:schemeClr>
+    </dgm:linClrLst>
+    <dgm:effectClrLst/>
+    <dgm:txLinClrLst/>
+    <dgm:txFillClrLst meth="repeat">
+      <a:schemeClr val="tx1"/>
+    </dgm:txFillClrLst>
+    <dgm:txEffectClrLst/>
+  </dgm:styleLbl>
+  <dgm:styleLbl name="parChTrans1D4">
+    <dgm:fillClrLst meth="repeat">
+      <a:schemeClr val="accent1"/>
+    </dgm:fillClrLst>
+    <dgm:linClrLst meth="repeat">
+      <a:schemeClr val="accent1">
+        <a:shade val="80000"/>
+      </a:schemeClr>
+    </dgm:linClrLst>
+    <dgm:effectClrLst/>
+    <dgm:txLinClrLst/>
+    <dgm:txFillClrLst meth="repeat">
+      <a:schemeClr val="tx1"/>
+    </dgm:txFillClrLst>
+    <dgm:txEffectClrLst/>
+  </dgm:styleLbl>
+  <dgm:styleLbl name="fgAcc1">
+    <dgm:fillClrLst meth="repeat">
+      <a:schemeClr val="lt1">
+        <a:alpha val="90000"/>
+      </a:schemeClr>
+    </dgm:fillClrLst>
+    <dgm:linClrLst meth="repeat">
+      <a:schemeClr val="accent1"/>
+    </dgm:linClrLst>
+    <dgm:effectClrLst/>
+    <dgm:txLinClrLst/>
+    <dgm:txFillClrLst meth="repeat">
+      <a:schemeClr val="dk1"/>
+    </dgm:txFillClrLst>
+    <dgm:txEffectClrLst/>
+  </dgm:styleLbl>
+  <dgm:styleLbl name="conFgAcc1">
+    <dgm:fillClrLst meth="repeat">
+      <a:schemeClr val="lt1">
+        <a:alpha val="90000"/>
+      </a:schemeClr>
+    </dgm:fillClrLst>
+    <dgm:linClrLst meth="repeat">
+      <a:schemeClr val="accent1"/>
+    </dgm:linClrLst>
+    <dgm:effectClrLst/>
+    <dgm:txLinClrLst/>
+    <dgm:txFillClrLst meth="repeat">
+      <a:schemeClr val="dk1"/>
+    </dgm:txFillClrLst>
+    <dgm:txEffectClrLst/>
+  </dgm:styleLbl>
+  <dgm:styleLbl name="alignAcc1">
+    <dgm:fillClrLst meth="repeat">
+      <a:schemeClr val="lt1">
+        <a:alpha val="90000"/>
+      </a:schemeClr>
+    </dgm:fillClrLst>
+    <dgm:linClrLst meth="repeat">
+      <a:schemeClr val="accent1"/>
+    </dgm:linClrLst>
+    <dgm:effectClrLst/>
+    <dgm:txLinClrLst/>
+    <dgm:txFillClrLst meth="repeat">
+      <a:schemeClr val="dk1"/>
+    </dgm:txFillClrLst>
+    <dgm:txEffectClrLst/>
+  </dgm:styleLbl>
+  <dgm:styleLbl name="trAlignAcc1">
+    <dgm:fillClrLst meth="repeat">
+      <a:schemeClr val="lt1">
+        <a:alpha val="40000"/>
+      </a:schemeClr>
+    </dgm:fillClrLst>
+    <dgm:linClrLst meth="repeat">
+      <a:schemeClr val="accent1"/>
+    </dgm:linClrLst>
+    <dgm:effectClrLst/>
+    <dgm:txLinClrLst/>
+    <dgm:txFillClrLst meth="repeat">
+      <a:schemeClr val="dk1"/>
+    </dgm:txFillClrLst>
+    <dgm:txEffectClrLst/>
+  </dgm:styleLbl>
+  <dgm:styleLbl name="bgAcc1">
+    <dgm:fillClrLst meth="repeat">
+      <a:schemeClr val="lt1">
+        <a:alpha val="90000"/>
+      </a:schemeClr>
+    </dgm:fillClrLst>
+    <dgm:linClrLst meth="repeat">
+      <a:schemeClr val="accent1"/>
+    </dgm:linClrLst>
+    <dgm:effectClrLst/>
+    <dgm:txLinClrLst/>
+    <dgm:txFillClrLst meth="repeat">
+      <a:schemeClr val="dk1"/>
+    </dgm:txFillClrLst>
+    <dgm:txEffectClrLst/>
+  </dgm:styleLbl>
+  <dgm:styleLbl name="solidFgAcc1">
+    <dgm:fillClrLst meth="repeat">
+      <a:schemeClr val="lt1"/>
+    </dgm:fillClrLst>
+    <dgm:linClrLst meth="repeat">
+      <a:schemeClr val="accent1"/>
+    </dgm:linClrLst>
+    <dgm:effectClrLst/>
+    <dgm:txLinClrLst/>
+    <dgm:txFillClrLst meth="repeat">
+      <a:schemeClr val="dk1"/>
+    </dgm:txFillClrLst>
+    <dgm:txEffectClrLst/>
+  </dgm:styleLbl>
+  <dgm:styleLbl name="solidAlignAcc1">
+    <dgm:fillClrLst meth="repeat">
+      <a:schemeClr val="lt1"/>
+    </dgm:fillClrLst>
+    <dgm:linClrLst meth="repeat">
+      <a:schemeClr val="accent1"/>
+    </dgm:linClrLst>
+    <dgm:effectClrLst/>
+    <dgm:txLinClrLst/>
+    <dgm:txFillClrLst meth="repeat">
+      <a:schemeClr val="dk1"/>
+    </dgm:txFillClrLst>
+    <dgm:txEffectClrLst/>
+  </dgm:styleLbl>
+  <dgm:styleLbl name="solidBgAcc1">
+    <dgm:fillClrLst meth="repeat">
+      <a:schemeClr val="lt1"/>
+    </dgm:fillClrLst>
+    <dgm:linClrLst meth="repeat">
+      <a:schemeClr val="accent1"/>
+    </dgm:linClrLst>
+    <dgm:effectClrLst/>
+    <dgm:txLinClrLst/>
+    <dgm:txFillClrLst meth="repeat">
+      <a:schemeClr val="dk1"/>
+    </dgm:txFillClrLst>
+    <dgm:txEffectClrLst/>
+  </dgm:styleLbl>
+  <dgm:styleLbl name="fgAccFollowNode1">
+    <dgm:fillClrLst meth="repeat">
+      <a:schemeClr val="accent1">
+        <a:alpha val="90000"/>
+        <a:tint val="40000"/>
+      </a:schemeClr>
+    </dgm:fillClrLst>
+    <dgm:linClrLst meth="repeat">
+      <a:schemeClr val="accent1">
+        <a:alpha val="90000"/>
+        <a:tint val="40000"/>
+      </a:schemeClr>
+    </dgm:linClrLst>
+    <dgm:effectClrLst/>
+    <dgm:txLinClrLst/>
+    <dgm:txFillClrLst meth="repeat">
+      <a:schemeClr val="dk1"/>
+    </dgm:txFillClrLst>
+    <dgm:txEffectClrLst/>
+  </dgm:styleLbl>
+  <dgm:styleLbl name="alignAccFollowNode1">
+    <dgm:fillClrLst meth="repeat">
+      <a:schemeClr val="accent1">
+        <a:alpha val="90000"/>
+        <a:tint val="40000"/>
+      </a:schemeClr>
+    </dgm:fillClrLst>
+    <dgm:linClrLst meth="repeat">
+      <a:schemeClr val="accent1">
+        <a:alpha val="90000"/>
+        <a:tint val="40000"/>
+      </a:schemeClr>
+    </dgm:linClrLst>
+    <dgm:effectClrLst/>
+    <dgm:txLinClrLst/>
+    <dgm:txFillClrLst meth="repeat">
+      <a:schemeClr val="dk1"/>
+    </dgm:txFillClrLst>
+    <dgm:txEffectClrLst/>
+  </dgm:styleLbl>
+  <dgm:styleLbl name="bgAccFollowNode1">
+    <dgm:fillClrLst meth="repeat">
+      <a:schemeClr val="accent1">
+        <a:alpha val="90000"/>
+        <a:tint val="40000"/>
+      </a:schemeClr>
+    </dgm:fillClrLst>
+    <dgm:linClrLst meth="repeat">
+      <a:schemeClr val="accent1">
+        <a:alpha val="90000"/>
+        <a:tint val="40000"/>
+      </a:schemeClr>
+    </dgm:linClrLst>
+    <dgm:effectClrLst/>
+    <dgm:txLinClrLst/>
+    <dgm:txFillClrLst meth="repeat">
+      <a:schemeClr val="dk1"/>
+    </dgm:txFillClrLst>
+    <dgm:txEffectClrLst/>
+  </dgm:styleLbl>
+  <dgm:styleLbl name="fgAcc0">
+    <dgm:fillClrLst meth="repeat">
+      <a:schemeClr val="lt1">
+        <a:alpha val="90000"/>
+      </a:schemeClr>
+    </dgm:fillClrLst>
+    <dgm:linClrLst meth="repeat">
+      <a:schemeClr val="accent1"/>
+    </dgm:linClrLst>
+    <dgm:effectClrLst/>
+    <dgm:txLinClrLst/>
+    <dgm:txFillClrLst meth="repeat">
+      <a:schemeClr val="dk1"/>
+    </dgm:txFillClrLst>
+    <dgm:txEffectClrLst/>
+  </dgm:styleLbl>
+  <dgm:styleLbl name="fgAcc2">
+    <dgm:fillClrLst meth="repeat">
+      <a:schemeClr val="lt1">
+        <a:alpha val="90000"/>
+      </a:schemeClr>
+    </dgm:fillClrLst>
+    <dgm:linClrLst meth="repeat">
+      <a:schemeClr val="accent1"/>
+    </dgm:linClrLst>
+    <dgm:effectClrLst/>
+    <dgm:txLinClrLst/>
+    <dgm:txFillClrLst meth="repeat">
+      <a:schemeClr val="dk1"/>
+    </dgm:txFillClrLst>
+    <dgm:txEffectClrLst/>
+  </dgm:styleLbl>
+  <dgm:styleLbl name="fgAcc3">
+    <dgm:fillClrLst meth="repeat">
+      <a:schemeClr val="lt1">
+        <a:alpha val="90000"/>
+      </a:schemeClr>
+    </dgm:fillClrLst>
+    <dgm:linClrLst meth="repeat">
+      <a:schemeClr val="accent1"/>
+    </dgm:linClrLst>
+    <dgm:effectClrLst/>
+    <dgm:txLinClrLst/>
+    <dgm:txFillClrLst meth="repeat">
+      <a:schemeClr val="dk1"/>
+    </dgm:txFillClrLst>
+    <dgm:txEffectClrLst/>
+  </dgm:styleLbl>
+  <dgm:styleLbl name="fgAcc4">
+    <dgm:fillClrLst meth="repeat">
+      <a:schemeClr val="lt1">
+        <a:alpha val="90000"/>
+      </a:schemeClr>
+    </dgm:fillClrLst>
+    <dgm:linClrLst meth="repeat">
+      <a:schemeClr val="accent1"/>
+    </dgm:linClrLst>
+    <dgm:effectClrLst/>
+    <dgm:txLinClrLst/>
+    <dgm:txFillClrLst meth="repeat">
+      <a:schemeClr val="dk1"/>
+    </dgm:txFillClrLst>
+    <dgm:txEffectClrLst/>
+  </dgm:styleLbl>
+  <dgm:styleLbl name="bgShp">
+    <dgm:fillClrLst meth="repeat">
+      <a:schemeClr val="accent1">
+        <a:tint val="40000"/>
+      </a:schemeClr>
+    </dgm:fillClrLst>
+    <dgm:linClrLst meth="repeat">
+      <a:schemeClr val="accent1"/>
+    </dgm:linClrLst>
+    <dgm:effectClrLst/>
+    <dgm:txLinClrLst/>
+    <dgm:txFillClrLst meth="repeat">
+      <a:schemeClr val="dk1"/>
+    </dgm:txFillClrLst>
+    <dgm:txEffectClrLst/>
+  </dgm:styleLbl>
+  <dgm:styleLbl name="dkBgShp">
+    <dgm:fillClrLst meth="repeat">
+      <a:schemeClr val="accent1">
+        <a:shade val="80000"/>
+      </a:schemeClr>
+    </dgm:fillClrLst>
+    <dgm:linClrLst meth="repeat">
+      <a:schemeClr val="accent1"/>
+    </dgm:linClrLst>
+    <dgm:effectClrLst/>
+    <dgm:txLinClrLst/>
+    <dgm:txFillClrLst meth="repeat">
+      <a:schemeClr val="lt1"/>
+    </dgm:txFillClrLst>
+    <dgm:txEffectClrLst/>
+  </dgm:styleLbl>
+  <dgm:styleLbl name="trBgShp">
+    <dgm:fillClrLst meth="repeat">
+      <a:schemeClr val="accent1">
+        <a:tint val="50000"/>
+        <a:alpha val="40000"/>
+      </a:schemeClr>
+    </dgm:fillClrLst>
+    <dgm:linClrLst meth="repeat">
+      <a:schemeClr val="accent1"/>
+    </dgm:linClrLst>
+    <dgm:effectClrLst/>
+    <dgm:txLinClrLst/>
+    <dgm:txFillClrLst meth="repeat">
+      <a:schemeClr val="lt1"/>
+    </dgm:txFillClrLst>
+    <dgm:txEffectClrLst/>
+  </dgm:styleLbl>
+  <dgm:styleLbl name="fgShp">
+    <dgm:fillClrLst meth="repeat">
+      <a:schemeClr val="accent1">
+        <a:tint val="60000"/>
+      </a:schemeClr>
+    </dgm:fillClrLst>
+    <dgm:linClrLst meth="repeat">
+      <a:schemeClr val="lt1"/>
+    </dgm:linClrLst>
+    <dgm:effectClrLst/>
+    <dgm:txLinClrLst/>
+    <dgm:txFillClrLst meth="repeat">
+      <a:schemeClr val="dk1"/>
+    </dgm:txFillClrLst>
+    <dgm:txEffectClrLst/>
+  </dgm:styleLbl>
+  <dgm:styleLbl name="revTx">
+    <dgm:fillClrLst meth="repeat">
+      <a:schemeClr val="lt1">
+        <a:alpha val="0"/>
+      </a:schemeClr>
+    </dgm:fillClrLst>
+    <dgm:linClrLst meth="repeat">
+      <a:schemeClr val="dk1">
+        <a:alpha val="0"/>
+      </a:schemeClr>
+    </dgm:linClrLst>
+    <dgm:effectClrLst/>
+    <dgm:txLinClrLst/>
+    <dgm:txFillClrLst meth="repeat">
+      <a:schemeClr val="tx1"/>
+    </dgm:txFillClrLst>
+    <dgm:txEffectClrLst/>
+  </dgm:styleLbl>
+</dgm:colorsDef>
+</file>
+
 <file path=ppt/diagrams/data1.xml><?xml version="1.0" encoding="utf-8"?>
 <dgm:dataModel xmlns:dgm="http://schemas.openxmlformats.org/drawingml/2006/diagram" xmlns:a="http://schemas.openxmlformats.org/drawingml/2006/main">
   <dgm:ptLst>
@@ -2190,6 +2938,13 @@
         </dgm:presLayoutVars>
       </dgm:prSet>
       <dgm:spPr/>
+      <dgm:t>
+        <a:bodyPr/>
+        <a:lstStyle/>
+        <a:p>
+          <a:endParaRPr lang="fr-FR"/>
+        </a:p>
+      </dgm:t>
     </dgm:pt>
     <dgm:pt modelId="{588B17C9-5BAC-4854-B434-75A90D9763E9}" type="pres">
       <dgm:prSet presAssocID="{0F648179-F4FC-47A4-BC6B-FFD4AF7477D7}" presName="node" presStyleLbl="node1" presStyleIdx="0" presStyleCnt="3" custScaleX="74816" custScaleY="30694">
@@ -2206,6 +2961,13 @@
           <a:avLst/>
         </a:prstGeom>
       </dgm:spPr>
+      <dgm:t>
+        <a:bodyPr/>
+        <a:lstStyle/>
+        <a:p>
+          <a:endParaRPr lang="fr-FR"/>
+        </a:p>
+      </dgm:t>
     </dgm:pt>
     <dgm:pt modelId="{CED5EF7D-F2CE-4242-A99B-3C08E54B93DC}" type="pres">
       <dgm:prSet presAssocID="{0F648179-F4FC-47A4-BC6B-FFD4AF7477D7}" presName="spNode" presStyleCnt="0"/>
@@ -2214,6 +2976,13 @@
     <dgm:pt modelId="{67ECA0E0-C4C4-4DB0-9F19-9B22FE2FB8B3}" type="pres">
       <dgm:prSet presAssocID="{29D95C5C-76D8-421A-967B-62E32F4C946B}" presName="sibTrans" presStyleLbl="sibTrans1D1" presStyleIdx="0" presStyleCnt="3"/>
       <dgm:spPr/>
+      <dgm:t>
+        <a:bodyPr/>
+        <a:lstStyle/>
+        <a:p>
+          <a:endParaRPr lang="fr-FR"/>
+        </a:p>
+      </dgm:t>
     </dgm:pt>
     <dgm:pt modelId="{257FD812-0516-4ABB-9FDD-73A119FBD787}" type="pres">
       <dgm:prSet presAssocID="{6CDEEBDA-C321-48AB-BBC9-14FE8B74AA84}" presName="node" presStyleLbl="node1" presStyleIdx="1" presStyleCnt="3" custScaleX="74816" custScaleY="30694" custRadScaleRad="108347" custRadScaleInc="-6293">
@@ -2222,6 +2991,13 @@
         </dgm:presLayoutVars>
       </dgm:prSet>
       <dgm:spPr/>
+      <dgm:t>
+        <a:bodyPr/>
+        <a:lstStyle/>
+        <a:p>
+          <a:endParaRPr lang="fr-FR"/>
+        </a:p>
+      </dgm:t>
     </dgm:pt>
     <dgm:pt modelId="{DD6A935D-7B6D-4BB7-B03A-4B82FAB0FC9F}" type="pres">
       <dgm:prSet presAssocID="{6CDEEBDA-C321-48AB-BBC9-14FE8B74AA84}" presName="spNode" presStyleCnt="0"/>
@@ -2230,6 +3006,13 @@
     <dgm:pt modelId="{98DA5AEB-0972-4B65-B097-DC55B46EC5C2}" type="pres">
       <dgm:prSet presAssocID="{BF51A3D4-06F4-4B3C-8C35-DB1E24899392}" presName="sibTrans" presStyleLbl="sibTrans1D1" presStyleIdx="1" presStyleCnt="3"/>
       <dgm:spPr/>
+      <dgm:t>
+        <a:bodyPr/>
+        <a:lstStyle/>
+        <a:p>
+          <a:endParaRPr lang="fr-FR"/>
+        </a:p>
+      </dgm:t>
     </dgm:pt>
     <dgm:pt modelId="{0A63F788-CDF4-414E-8169-F1D6559D957B}" type="pres">
       <dgm:prSet presAssocID="{CF2400FD-34F4-442A-B375-7D429FE27613}" presName="node" presStyleLbl="node1" presStyleIdx="2" presStyleCnt="3" custScaleX="74816" custScaleY="30694" custRadScaleRad="106698" custRadScaleInc="5140">
@@ -2246,6 +3029,13 @@
           <a:avLst/>
         </a:prstGeom>
       </dgm:spPr>
+      <dgm:t>
+        <a:bodyPr/>
+        <a:lstStyle/>
+        <a:p>
+          <a:endParaRPr lang="fr-FR"/>
+        </a:p>
+      </dgm:t>
     </dgm:pt>
     <dgm:pt modelId="{5C982D4D-5490-4628-BD76-7094654E8BB8}" type="pres">
       <dgm:prSet presAssocID="{CF2400FD-34F4-442A-B375-7D429FE27613}" presName="spNode" presStyleCnt="0"/>
@@ -2254,19 +3044,437 @@
     <dgm:pt modelId="{E9E59BD6-A9E3-4760-AF64-CF5F8B07EEA6}" type="pres">
       <dgm:prSet presAssocID="{AB5D075B-8636-43BB-BFBF-A79B05881902}" presName="sibTrans" presStyleLbl="sibTrans1D1" presStyleIdx="2" presStyleCnt="3"/>
       <dgm:spPr/>
+      <dgm:t>
+        <a:bodyPr/>
+        <a:lstStyle/>
+        <a:p>
+          <a:endParaRPr lang="fr-FR"/>
+        </a:p>
+      </dgm:t>
     </dgm:pt>
   </dgm:ptLst>
   <dgm:cxnLst>
-    <dgm:cxn modelId="{5FF8E435-298E-4EF9-BC8E-206F82822D64}" type="presOf" srcId="{0F648179-F4FC-47A4-BC6B-FFD4AF7477D7}" destId="{588B17C9-5BAC-4854-B434-75A90D9763E9}" srcOrd="0" destOrd="0" presId="urn:microsoft.com/office/officeart/2005/8/layout/cycle5"/>
+    <dgm:cxn modelId="{62856AEB-C475-4BF1-85AC-752862812348}" type="presOf" srcId="{29D95C5C-76D8-421A-967B-62E32F4C946B}" destId="{67ECA0E0-C4C4-4DB0-9F19-9B22FE2FB8B3}" srcOrd="0" destOrd="0" presId="urn:microsoft.com/office/officeart/2005/8/layout/cycle5"/>
+    <dgm:cxn modelId="{9827EA90-733F-46F8-AA47-1DBD8EB07342}" type="presOf" srcId="{3178A9B6-3163-4034-8186-EED85E425845}" destId="{7923F0E7-C9DA-4D36-A324-46729F47CE0D}" srcOrd="0" destOrd="0" presId="urn:microsoft.com/office/officeart/2005/8/layout/cycle5"/>
+    <dgm:cxn modelId="{0341F5EF-6F14-4BC1-A5E1-722E49F2BE35}" srcId="{3178A9B6-3163-4034-8186-EED85E425845}" destId="{6CDEEBDA-C321-48AB-BBC9-14FE8B74AA84}" srcOrd="1" destOrd="0" parTransId="{943CFB5D-865A-4AE9-ADDF-CCC8D3C38C75}" sibTransId="{BF51A3D4-06F4-4B3C-8C35-DB1E24899392}"/>
     <dgm:cxn modelId="{015E825D-A08F-4AD6-A69D-41953D0816FB}" type="presOf" srcId="{6CDEEBDA-C321-48AB-BBC9-14FE8B74AA84}" destId="{257FD812-0516-4ABB-9FDD-73A119FBD787}" srcOrd="0" destOrd="0" presId="urn:microsoft.com/office/officeart/2005/8/layout/cycle5"/>
+    <dgm:cxn modelId="{5B2D7D84-3D5F-4F88-BBF5-92468524B902}" srcId="{3178A9B6-3163-4034-8186-EED85E425845}" destId="{CF2400FD-34F4-442A-B375-7D429FE27613}" srcOrd="2" destOrd="0" parTransId="{FEF26B50-A675-458F-AED3-A2CED366D5E3}" sibTransId="{AB5D075B-8636-43BB-BFBF-A79B05881902}"/>
     <dgm:cxn modelId="{D9025073-4D20-461B-AB2B-7EB2C813E6AE}" type="presOf" srcId="{BF51A3D4-06F4-4B3C-8C35-DB1E24899392}" destId="{98DA5AEB-0972-4B65-B097-DC55B46EC5C2}" srcOrd="0" destOrd="0" presId="urn:microsoft.com/office/officeart/2005/8/layout/cycle5"/>
-    <dgm:cxn modelId="{5B2D7D84-3D5F-4F88-BBF5-92468524B902}" srcId="{3178A9B6-3163-4034-8186-EED85E425845}" destId="{CF2400FD-34F4-442A-B375-7D429FE27613}" srcOrd="2" destOrd="0" parTransId="{FEF26B50-A675-458F-AED3-A2CED366D5E3}" sibTransId="{AB5D075B-8636-43BB-BFBF-A79B05881902}"/>
-    <dgm:cxn modelId="{9827EA90-733F-46F8-AA47-1DBD8EB07342}" type="presOf" srcId="{3178A9B6-3163-4034-8186-EED85E425845}" destId="{7923F0E7-C9DA-4D36-A324-46729F47CE0D}" srcOrd="0" destOrd="0" presId="urn:microsoft.com/office/officeart/2005/8/layout/cycle5"/>
     <dgm:cxn modelId="{20547DA5-E4D8-4CCC-A141-A3E5EAFFB4A5}" type="presOf" srcId="{AB5D075B-8636-43BB-BFBF-A79B05881902}" destId="{E9E59BD6-A9E3-4760-AF64-CF5F8B07EEA6}" srcOrd="0" destOrd="0" presId="urn:microsoft.com/office/officeart/2005/8/layout/cycle5"/>
     <dgm:cxn modelId="{6A45D8B7-54EB-45CB-894B-15CB0DFD6A0D}" type="presOf" srcId="{CF2400FD-34F4-442A-B375-7D429FE27613}" destId="{0A63F788-CDF4-414E-8169-F1D6559D957B}" srcOrd="0" destOrd="0" presId="urn:microsoft.com/office/officeart/2005/8/layout/cycle5"/>
     <dgm:cxn modelId="{30921DC3-02B3-4C8C-B01A-22EF4DC07F5C}" srcId="{3178A9B6-3163-4034-8186-EED85E425845}" destId="{0F648179-F4FC-47A4-BC6B-FFD4AF7477D7}" srcOrd="0" destOrd="0" parTransId="{2117420C-2FB8-4077-93F8-D80040716AC5}" sibTransId="{29D95C5C-76D8-421A-967B-62E32F4C946B}"/>
+    <dgm:cxn modelId="{5FF8E435-298E-4EF9-BC8E-206F82822D64}" type="presOf" srcId="{0F648179-F4FC-47A4-BC6B-FFD4AF7477D7}" destId="{588B17C9-5BAC-4854-B434-75A90D9763E9}" srcOrd="0" destOrd="0" presId="urn:microsoft.com/office/officeart/2005/8/layout/cycle5"/>
+    <dgm:cxn modelId="{47C01C79-673A-40DE-BF8A-2FF76E377200}" type="presParOf" srcId="{7923F0E7-C9DA-4D36-A324-46729F47CE0D}" destId="{588B17C9-5BAC-4854-B434-75A90D9763E9}" srcOrd="0" destOrd="0" presId="urn:microsoft.com/office/officeart/2005/8/layout/cycle5"/>
+    <dgm:cxn modelId="{65F218A4-6C2A-40D8-B14E-BF8DB7CFC2D7}" type="presParOf" srcId="{7923F0E7-C9DA-4D36-A324-46729F47CE0D}" destId="{CED5EF7D-F2CE-4242-A99B-3C08E54B93DC}" srcOrd="1" destOrd="0" presId="urn:microsoft.com/office/officeart/2005/8/layout/cycle5"/>
+    <dgm:cxn modelId="{238388A1-7C34-498C-9842-19F53765FE9D}" type="presParOf" srcId="{7923F0E7-C9DA-4D36-A324-46729F47CE0D}" destId="{67ECA0E0-C4C4-4DB0-9F19-9B22FE2FB8B3}" srcOrd="2" destOrd="0" presId="urn:microsoft.com/office/officeart/2005/8/layout/cycle5"/>
+    <dgm:cxn modelId="{C7CD0616-C9F6-4D25-816A-07A98FC4F330}" type="presParOf" srcId="{7923F0E7-C9DA-4D36-A324-46729F47CE0D}" destId="{257FD812-0516-4ABB-9FDD-73A119FBD787}" srcOrd="3" destOrd="0" presId="urn:microsoft.com/office/officeart/2005/8/layout/cycle5"/>
+    <dgm:cxn modelId="{05AAFE98-471D-4D86-9B1F-78B51B3E9387}" type="presParOf" srcId="{7923F0E7-C9DA-4D36-A324-46729F47CE0D}" destId="{DD6A935D-7B6D-4BB7-B03A-4B82FAB0FC9F}" srcOrd="4" destOrd="0" presId="urn:microsoft.com/office/officeart/2005/8/layout/cycle5"/>
+    <dgm:cxn modelId="{D956C167-7ADC-4ABB-B507-FA558D4F3F56}" type="presParOf" srcId="{7923F0E7-C9DA-4D36-A324-46729F47CE0D}" destId="{98DA5AEB-0972-4B65-B097-DC55B46EC5C2}" srcOrd="5" destOrd="0" presId="urn:microsoft.com/office/officeart/2005/8/layout/cycle5"/>
+    <dgm:cxn modelId="{375BF0D0-7810-4553-A430-288A88CA3113}" type="presParOf" srcId="{7923F0E7-C9DA-4D36-A324-46729F47CE0D}" destId="{0A63F788-CDF4-414E-8169-F1D6559D957B}" srcOrd="6" destOrd="0" presId="urn:microsoft.com/office/officeart/2005/8/layout/cycle5"/>
+    <dgm:cxn modelId="{E5DE6801-2B3E-468B-A619-88061FD9CBC5}" type="presParOf" srcId="{7923F0E7-C9DA-4D36-A324-46729F47CE0D}" destId="{5C982D4D-5490-4628-BD76-7094654E8BB8}" srcOrd="7" destOrd="0" presId="urn:microsoft.com/office/officeart/2005/8/layout/cycle5"/>
+    <dgm:cxn modelId="{FF7F014F-CFDC-497D-8995-DC2A5D15CFA8}" type="presParOf" srcId="{7923F0E7-C9DA-4D36-A324-46729F47CE0D}" destId="{E9E59BD6-A9E3-4760-AF64-CF5F8B07EEA6}" srcOrd="8" destOrd="0" presId="urn:microsoft.com/office/officeart/2005/8/layout/cycle5"/>
+  </dgm:cxnLst>
+  <dgm:bg/>
+  <dgm:whole/>
+  <dgm:extLst>
+    <a:ext uri="http://schemas.microsoft.com/office/drawing/2008/diagram">
+      <dsp:dataModelExt xmlns:dsp="http://schemas.microsoft.com/office/drawing/2008/diagram" relId="rId6" minVer="http://schemas.openxmlformats.org/drawingml/2006/diagram"/>
+    </a:ext>
+  </dgm:extLst>
+</dgm:dataModel>
+</file>
+
+<file path=ppt/diagrams/data2.xml><?xml version="1.0" encoding="utf-8"?>
+<dgm:dataModel xmlns:dgm="http://schemas.openxmlformats.org/drawingml/2006/diagram" xmlns:a="http://schemas.openxmlformats.org/drawingml/2006/main">
+  <dgm:ptLst>
+    <dgm:pt modelId="{3178A9B6-3163-4034-8186-EED85E425845}" type="doc">
+      <dgm:prSet loTypeId="urn:microsoft.com/office/officeart/2005/8/layout/cycle5" loCatId="cycle" qsTypeId="urn:microsoft.com/office/officeart/2005/8/quickstyle/simple1" qsCatId="simple" csTypeId="urn:microsoft.com/office/officeart/2005/8/colors/accent1_2" csCatId="accent1" phldr="1"/>
+      <dgm:spPr/>
+      <dgm:t>
+        <a:bodyPr/>
+        <a:lstStyle/>
+        <a:p>
+          <a:endParaRPr lang="fr-FR"/>
+        </a:p>
+      </dgm:t>
+    </dgm:pt>
+    <dgm:pt modelId="{0F648179-F4FC-47A4-BC6B-FFD4AF7477D7}">
+      <dgm:prSet phldrT="[Texte]" custT="1">
+        <dgm:style>
+          <a:lnRef idx="2">
+            <a:schemeClr val="accent1">
+              <a:shade val="50000"/>
+            </a:schemeClr>
+          </a:lnRef>
+          <a:fillRef idx="1">
+            <a:schemeClr val="accent1"/>
+          </a:fillRef>
+          <a:effectRef idx="0">
+            <a:schemeClr val="accent1"/>
+          </a:effectRef>
+          <a:fontRef idx="minor">
+            <a:schemeClr val="lt1"/>
+          </a:fontRef>
+        </dgm:style>
+      </dgm:prSet>
+      <dgm:spPr>
+        <a:solidFill>
+          <a:srgbClr val="F5F5F5"/>
+        </a:solidFill>
+        <a:ln>
+          <a:noFill/>
+        </a:ln>
+      </dgm:spPr>
+      <dgm:t>
+        <a:bodyPr rot="0" spcFirstLastPara="0" vertOverflow="overflow" horzOverflow="overflow" vert="horz" wrap="square" lIns="91440" tIns="45720" rIns="91440" bIns="45720" numCol="1" spcCol="1270" rtlCol="0" fromWordArt="0" anchor="ctr" anchorCtr="0" forceAA="0" compatLnSpc="1">
+          <a:prstTxWarp prst="textNoShape">
+            <a:avLst/>
+          </a:prstTxWarp>
+        </a:bodyPr>
+        <a:lstStyle/>
+        <a:p>
+          <a:pPr marL="0" lvl="0" indent="0" algn="ctr" defTabSz="914400" rtl="0" eaLnBrk="1" latinLnBrk="0" hangingPunct="1">
+            <a:lnSpc>
+              <a:spcPct val="90000"/>
+            </a:lnSpc>
+            <a:spcBef>
+              <a:spcPct val="0"/>
+            </a:spcBef>
+            <a:spcAft>
+              <a:spcPct val="35000"/>
+            </a:spcAft>
+            <a:buNone/>
+          </a:pPr>
+          <a:r>
+            <a:rPr lang="fr-FR" sz="1200" kern="1200" dirty="0" err="1">
+              <a:solidFill>
+                <a:srgbClr val="3D2E2D"/>
+              </a:solidFill>
+              <a:latin typeface="Consolas" panose="020B0609020204030204" pitchFamily="49" charset="0"/>
+              <a:ea typeface="Verdana" panose="020B0604030504040204" pitchFamily="34" charset="0"/>
+              <a:cs typeface="Times New Roman" panose="02020603050405020304" pitchFamily="18" charset="0"/>
+            </a:rPr>
+            <a:t>Set_usm</a:t>
+          </a:r>
+          <a:endParaRPr lang="fr-FR" sz="1200" kern="1200" dirty="0">
+            <a:solidFill>
+              <a:srgbClr val="3D2E2D"/>
+            </a:solidFill>
+            <a:latin typeface="Consolas" panose="020B0609020204030204" pitchFamily="49" charset="0"/>
+            <a:ea typeface="Verdana" panose="020B0604030504040204" pitchFamily="34" charset="0"/>
+            <a:cs typeface="Times New Roman" panose="02020603050405020304" pitchFamily="18" charset="0"/>
+          </a:endParaRPr>
+        </a:p>
+      </dgm:t>
+    </dgm:pt>
+    <dgm:pt modelId="{2117420C-2FB8-4077-93F8-D80040716AC5}" type="parTrans" cxnId="{30921DC3-02B3-4C8C-B01A-22EF4DC07F5C}">
+      <dgm:prSet/>
+      <dgm:spPr/>
+      <dgm:t>
+        <a:bodyPr/>
+        <a:lstStyle/>
+        <a:p>
+          <a:endParaRPr lang="fr-FR"/>
+        </a:p>
+      </dgm:t>
+    </dgm:pt>
+    <dgm:pt modelId="{29D95C5C-76D8-421A-967B-62E32F4C946B}" type="sibTrans" cxnId="{30921DC3-02B3-4C8C-B01A-22EF4DC07F5C}">
+      <dgm:prSet/>
+      <dgm:spPr>
+        <a:ln>
+          <a:solidFill>
+            <a:schemeClr val="tx1"/>
+          </a:solidFill>
+          <a:tailEnd type="triangle"/>
+        </a:ln>
+      </dgm:spPr>
+      <dgm:t>
+        <a:bodyPr/>
+        <a:lstStyle/>
+        <a:p>
+          <a:endParaRPr lang="fr-FR"/>
+        </a:p>
+      </dgm:t>
+    </dgm:pt>
+    <dgm:pt modelId="{6CDEEBDA-C321-48AB-BBC9-14FE8B74AA84}">
+      <dgm:prSet phldrT="[Texte]" custT="1"/>
+      <dgm:spPr>
+        <a:solidFill>
+          <a:srgbClr val="F5F5F5"/>
+        </a:solidFill>
+        <a:ln>
+          <a:noFill/>
+        </a:ln>
+      </dgm:spPr>
+      <dgm:t>
+        <a:bodyPr/>
+        <a:lstStyle/>
+        <a:p>
+          <a:r>
+            <a:rPr lang="fr-FR" sz="1200" kern="1200" dirty="0" err="1">
+              <a:solidFill>
+                <a:prstClr val="black">
+                  <a:lumMod val="75000"/>
+                  <a:lumOff val="25000"/>
+                </a:prstClr>
+              </a:solidFill>
+              <a:latin typeface="Consolas" panose="020B0609020204030204" pitchFamily="49" charset="0"/>
+              <a:ea typeface="Verdana" panose="020B0604030504040204" pitchFamily="34" charset="0"/>
+              <a:cs typeface="Times New Roman" panose="02020603050405020304" pitchFamily="18" charset="0"/>
+            </a:rPr>
+            <a:t>Run_stics</a:t>
+          </a:r>
+          <a:endParaRPr lang="fr-FR" sz="1200" kern="1200" dirty="0">
+            <a:solidFill>
+              <a:prstClr val="black">
+                <a:lumMod val="75000"/>
+                <a:lumOff val="25000"/>
+              </a:prstClr>
+            </a:solidFill>
+            <a:latin typeface="Consolas" panose="020B0609020204030204" pitchFamily="49" charset="0"/>
+            <a:ea typeface="Verdana" panose="020B0604030504040204" pitchFamily="34" charset="0"/>
+            <a:cs typeface="Times New Roman" panose="02020603050405020304" pitchFamily="18" charset="0"/>
+          </a:endParaRPr>
+        </a:p>
+      </dgm:t>
+    </dgm:pt>
+    <dgm:pt modelId="{943CFB5D-865A-4AE9-ADDF-CCC8D3C38C75}" type="parTrans" cxnId="{0341F5EF-6F14-4BC1-A5E1-722E49F2BE35}">
+      <dgm:prSet/>
+      <dgm:spPr/>
+      <dgm:t>
+        <a:bodyPr/>
+        <a:lstStyle/>
+        <a:p>
+          <a:endParaRPr lang="fr-FR"/>
+        </a:p>
+      </dgm:t>
+    </dgm:pt>
+    <dgm:pt modelId="{BF51A3D4-06F4-4B3C-8C35-DB1E24899392}" type="sibTrans" cxnId="{0341F5EF-6F14-4BC1-A5E1-722E49F2BE35}">
+      <dgm:prSet/>
+      <dgm:spPr>
+        <a:ln>
+          <a:solidFill>
+            <a:schemeClr val="tx1"/>
+          </a:solidFill>
+          <a:tailEnd type="triangle"/>
+        </a:ln>
+      </dgm:spPr>
+      <dgm:t>
+        <a:bodyPr/>
+        <a:lstStyle/>
+        <a:p>
+          <a:endParaRPr lang="fr-FR"/>
+        </a:p>
+      </dgm:t>
+    </dgm:pt>
+    <dgm:pt modelId="{CF2400FD-34F4-442A-B375-7D429FE27613}">
+      <dgm:prSet phldrT="[Texte]" custT="1"/>
+      <dgm:spPr>
+        <a:solidFill>
+          <a:srgbClr val="F5F5F5"/>
+        </a:solidFill>
+        <a:ln w="12700" cap="flat" cmpd="sng" algn="ctr">
+          <a:noFill/>
+          <a:prstDash val="solid"/>
+          <a:miter lim="800000"/>
+        </a:ln>
+        <a:effectLst/>
+      </dgm:spPr>
+      <dgm:t>
+        <a:bodyPr spcFirstLastPara="0" vert="horz" wrap="square" lIns="45720" tIns="45720" rIns="45720" bIns="45720" numCol="1" spcCol="1270" anchor="ctr" anchorCtr="0"/>
+        <a:lstStyle/>
+        <a:p>
+          <a:r>
+            <a:rPr lang="fr-FR" sz="1200" kern="1200" dirty="0" err="1">
+              <a:solidFill>
+                <a:prstClr val="black">
+                  <a:lumMod val="75000"/>
+                  <a:lumOff val="25000"/>
+                </a:prstClr>
+              </a:solidFill>
+              <a:latin typeface="Consolas" panose="020B0609020204030204" pitchFamily="49" charset="0"/>
+              <a:ea typeface="Verdana" panose="020B0604030504040204" pitchFamily="34" charset="0"/>
+              <a:cs typeface="Times New Roman" panose="02020603050405020304" pitchFamily="18" charset="0"/>
+            </a:rPr>
+            <a:t>Eval_output</a:t>
+          </a:r>
+          <a:endParaRPr lang="fr-FR" sz="1200" kern="1200" dirty="0">
+            <a:solidFill>
+              <a:prstClr val="black">
+                <a:lumMod val="75000"/>
+                <a:lumOff val="25000"/>
+              </a:prstClr>
+            </a:solidFill>
+            <a:latin typeface="Consolas" panose="020B0609020204030204" pitchFamily="49" charset="0"/>
+            <a:ea typeface="Verdana" panose="020B0604030504040204" pitchFamily="34" charset="0"/>
+            <a:cs typeface="Times New Roman" panose="02020603050405020304" pitchFamily="18" charset="0"/>
+          </a:endParaRPr>
+        </a:p>
+      </dgm:t>
+    </dgm:pt>
+    <dgm:pt modelId="{FEF26B50-A675-458F-AED3-A2CED366D5E3}" type="parTrans" cxnId="{5B2D7D84-3D5F-4F88-BBF5-92468524B902}">
+      <dgm:prSet/>
+      <dgm:spPr/>
+      <dgm:t>
+        <a:bodyPr/>
+        <a:lstStyle/>
+        <a:p>
+          <a:endParaRPr lang="fr-FR"/>
+        </a:p>
+      </dgm:t>
+    </dgm:pt>
+    <dgm:pt modelId="{AB5D075B-8636-43BB-BFBF-A79B05881902}" type="sibTrans" cxnId="{5B2D7D84-3D5F-4F88-BBF5-92468524B902}">
+      <dgm:prSet/>
+      <dgm:spPr>
+        <a:ln>
+          <a:solidFill>
+            <a:schemeClr val="tx1"/>
+          </a:solidFill>
+          <a:tailEnd type="triangle"/>
+        </a:ln>
+      </dgm:spPr>
+      <dgm:t>
+        <a:bodyPr/>
+        <a:lstStyle/>
+        <a:p>
+          <a:endParaRPr lang="fr-FR"/>
+        </a:p>
+      </dgm:t>
+    </dgm:pt>
+    <dgm:pt modelId="{7923F0E7-C9DA-4D36-A324-46729F47CE0D}" type="pres">
+      <dgm:prSet presAssocID="{3178A9B6-3163-4034-8186-EED85E425845}" presName="cycle" presStyleCnt="0">
+        <dgm:presLayoutVars>
+          <dgm:dir/>
+          <dgm:resizeHandles val="exact"/>
+        </dgm:presLayoutVars>
+      </dgm:prSet>
+      <dgm:spPr/>
+      <dgm:t>
+        <a:bodyPr/>
+        <a:lstStyle/>
+        <a:p>
+          <a:endParaRPr lang="fr-FR"/>
+        </a:p>
+      </dgm:t>
+    </dgm:pt>
+    <dgm:pt modelId="{588B17C9-5BAC-4854-B434-75A90D9763E9}" type="pres">
+      <dgm:prSet presAssocID="{0F648179-F4FC-47A4-BC6B-FFD4AF7477D7}" presName="node" presStyleLbl="node1" presStyleIdx="0" presStyleCnt="3" custScaleX="74816" custScaleY="30694">
+        <dgm:presLayoutVars>
+          <dgm:bulletEnabled val="1"/>
+        </dgm:presLayoutVars>
+      </dgm:prSet>
+      <dgm:spPr>
+        <a:xfrm>
+          <a:off x="980404" y="105272"/>
+          <a:ext cx="1177195" cy="205200"/>
+        </a:xfrm>
+        <a:prstGeom prst="roundRect">
+          <a:avLst/>
+        </a:prstGeom>
+      </dgm:spPr>
+      <dgm:t>
+        <a:bodyPr/>
+        <a:lstStyle/>
+        <a:p>
+          <a:endParaRPr lang="fr-FR"/>
+        </a:p>
+      </dgm:t>
+    </dgm:pt>
+    <dgm:pt modelId="{CED5EF7D-F2CE-4242-A99B-3C08E54B93DC}" type="pres">
+      <dgm:prSet presAssocID="{0F648179-F4FC-47A4-BC6B-FFD4AF7477D7}" presName="spNode" presStyleCnt="0"/>
+      <dgm:spPr/>
+    </dgm:pt>
+    <dgm:pt modelId="{67ECA0E0-C4C4-4DB0-9F19-9B22FE2FB8B3}" type="pres">
+      <dgm:prSet presAssocID="{29D95C5C-76D8-421A-967B-62E32F4C946B}" presName="sibTrans" presStyleLbl="sibTrans1D1" presStyleIdx="0" presStyleCnt="3"/>
+      <dgm:spPr/>
+      <dgm:t>
+        <a:bodyPr/>
+        <a:lstStyle/>
+        <a:p>
+          <a:endParaRPr lang="fr-FR"/>
+        </a:p>
+      </dgm:t>
+    </dgm:pt>
+    <dgm:pt modelId="{257FD812-0516-4ABB-9FDD-73A119FBD787}" type="pres">
+      <dgm:prSet presAssocID="{6CDEEBDA-C321-48AB-BBC9-14FE8B74AA84}" presName="node" presStyleLbl="node1" presStyleIdx="1" presStyleCnt="3" custScaleX="74816" custScaleY="30694" custRadScaleRad="108347" custRadScaleInc="-6293">
+        <dgm:presLayoutVars>
+          <dgm:bulletEnabled val="1"/>
+        </dgm:presLayoutVars>
+      </dgm:prSet>
+      <dgm:spPr/>
+      <dgm:t>
+        <a:bodyPr/>
+        <a:lstStyle/>
+        <a:p>
+          <a:endParaRPr lang="fr-FR"/>
+        </a:p>
+      </dgm:t>
+    </dgm:pt>
+    <dgm:pt modelId="{DD6A935D-7B6D-4BB7-B03A-4B82FAB0FC9F}" type="pres">
+      <dgm:prSet presAssocID="{6CDEEBDA-C321-48AB-BBC9-14FE8B74AA84}" presName="spNode" presStyleCnt="0"/>
+      <dgm:spPr/>
+    </dgm:pt>
+    <dgm:pt modelId="{98DA5AEB-0972-4B65-B097-DC55B46EC5C2}" type="pres">
+      <dgm:prSet presAssocID="{BF51A3D4-06F4-4B3C-8C35-DB1E24899392}" presName="sibTrans" presStyleLbl="sibTrans1D1" presStyleIdx="1" presStyleCnt="3"/>
+      <dgm:spPr/>
+      <dgm:t>
+        <a:bodyPr/>
+        <a:lstStyle/>
+        <a:p>
+          <a:endParaRPr lang="fr-FR"/>
+        </a:p>
+      </dgm:t>
+    </dgm:pt>
+    <dgm:pt modelId="{0A63F788-CDF4-414E-8169-F1D6559D957B}" type="pres">
+      <dgm:prSet presAssocID="{CF2400FD-34F4-442A-B375-7D429FE27613}" presName="node" presStyleLbl="node1" presStyleIdx="2" presStyleCnt="3" custScaleX="74816" custScaleY="30694" custRadScaleRad="106698" custRadScaleInc="5140">
+        <dgm:presLayoutVars>
+          <dgm:bulletEnabled val="1"/>
+        </dgm:presLayoutVars>
+      </dgm:prSet>
+      <dgm:spPr>
+        <a:xfrm>
+          <a:off x="259976" y="1353089"/>
+          <a:ext cx="1177195" cy="205200"/>
+        </a:xfrm>
+        <a:prstGeom prst="roundRect">
+          <a:avLst/>
+        </a:prstGeom>
+      </dgm:spPr>
+      <dgm:t>
+        <a:bodyPr/>
+        <a:lstStyle/>
+        <a:p>
+          <a:endParaRPr lang="fr-FR"/>
+        </a:p>
+      </dgm:t>
+    </dgm:pt>
+    <dgm:pt modelId="{5C982D4D-5490-4628-BD76-7094654E8BB8}" type="pres">
+      <dgm:prSet presAssocID="{CF2400FD-34F4-442A-B375-7D429FE27613}" presName="spNode" presStyleCnt="0"/>
+      <dgm:spPr/>
+    </dgm:pt>
+    <dgm:pt modelId="{E9E59BD6-A9E3-4760-AF64-CF5F8B07EEA6}" type="pres">
+      <dgm:prSet presAssocID="{AB5D075B-8636-43BB-BFBF-A79B05881902}" presName="sibTrans" presStyleLbl="sibTrans1D1" presStyleIdx="2" presStyleCnt="3"/>
+      <dgm:spPr/>
+      <dgm:t>
+        <a:bodyPr/>
+        <a:lstStyle/>
+        <a:p>
+          <a:endParaRPr lang="fr-FR"/>
+        </a:p>
+      </dgm:t>
+    </dgm:pt>
+  </dgm:ptLst>
+  <dgm:cxnLst>
     <dgm:cxn modelId="{62856AEB-C475-4BF1-85AC-752862812348}" type="presOf" srcId="{29D95C5C-76D8-421A-967B-62E32F4C946B}" destId="{67ECA0E0-C4C4-4DB0-9F19-9B22FE2FB8B3}" srcOrd="0" destOrd="0" presId="urn:microsoft.com/office/officeart/2005/8/layout/cycle5"/>
+    <dgm:cxn modelId="{9827EA90-733F-46F8-AA47-1DBD8EB07342}" type="presOf" srcId="{3178A9B6-3163-4034-8186-EED85E425845}" destId="{7923F0E7-C9DA-4D36-A324-46729F47CE0D}" srcOrd="0" destOrd="0" presId="urn:microsoft.com/office/officeart/2005/8/layout/cycle5"/>
     <dgm:cxn modelId="{0341F5EF-6F14-4BC1-A5E1-722E49F2BE35}" srcId="{3178A9B6-3163-4034-8186-EED85E425845}" destId="{6CDEEBDA-C321-48AB-BBC9-14FE8B74AA84}" srcOrd="1" destOrd="0" parTransId="{943CFB5D-865A-4AE9-ADDF-CCC8D3C38C75}" sibTransId="{BF51A3D4-06F4-4B3C-8C35-DB1E24899392}"/>
+    <dgm:cxn modelId="{015E825D-A08F-4AD6-A69D-41953D0816FB}" type="presOf" srcId="{6CDEEBDA-C321-48AB-BBC9-14FE8B74AA84}" destId="{257FD812-0516-4ABB-9FDD-73A119FBD787}" srcOrd="0" destOrd="0" presId="urn:microsoft.com/office/officeart/2005/8/layout/cycle5"/>
+    <dgm:cxn modelId="{5B2D7D84-3D5F-4F88-BBF5-92468524B902}" srcId="{3178A9B6-3163-4034-8186-EED85E425845}" destId="{CF2400FD-34F4-442A-B375-7D429FE27613}" srcOrd="2" destOrd="0" parTransId="{FEF26B50-A675-458F-AED3-A2CED366D5E3}" sibTransId="{AB5D075B-8636-43BB-BFBF-A79B05881902}"/>
+    <dgm:cxn modelId="{D9025073-4D20-461B-AB2B-7EB2C813E6AE}" type="presOf" srcId="{BF51A3D4-06F4-4B3C-8C35-DB1E24899392}" destId="{98DA5AEB-0972-4B65-B097-DC55B46EC5C2}" srcOrd="0" destOrd="0" presId="urn:microsoft.com/office/officeart/2005/8/layout/cycle5"/>
+    <dgm:cxn modelId="{20547DA5-E4D8-4CCC-A141-A3E5EAFFB4A5}" type="presOf" srcId="{AB5D075B-8636-43BB-BFBF-A79B05881902}" destId="{E9E59BD6-A9E3-4760-AF64-CF5F8B07EEA6}" srcOrd="0" destOrd="0" presId="urn:microsoft.com/office/officeart/2005/8/layout/cycle5"/>
+    <dgm:cxn modelId="{6A45D8B7-54EB-45CB-894B-15CB0DFD6A0D}" type="presOf" srcId="{CF2400FD-34F4-442A-B375-7D429FE27613}" destId="{0A63F788-CDF4-414E-8169-F1D6559D957B}" srcOrd="0" destOrd="0" presId="urn:microsoft.com/office/officeart/2005/8/layout/cycle5"/>
+    <dgm:cxn modelId="{30921DC3-02B3-4C8C-B01A-22EF4DC07F5C}" srcId="{3178A9B6-3163-4034-8186-EED85E425845}" destId="{0F648179-F4FC-47A4-BC6B-FFD4AF7477D7}" srcOrd="0" destOrd="0" parTransId="{2117420C-2FB8-4077-93F8-D80040716AC5}" sibTransId="{29D95C5C-76D8-421A-967B-62E32F4C946B}"/>
+    <dgm:cxn modelId="{5FF8E435-298E-4EF9-BC8E-206F82822D64}" type="presOf" srcId="{0F648179-F4FC-47A4-BC6B-FFD4AF7477D7}" destId="{588B17C9-5BAC-4854-B434-75A90D9763E9}" srcOrd="0" destOrd="0" presId="urn:microsoft.com/office/officeart/2005/8/layout/cycle5"/>
     <dgm:cxn modelId="{47C01C79-673A-40DE-BF8A-2FF76E377200}" type="presParOf" srcId="{7923F0E7-C9DA-4D36-A324-46729F47CE0D}" destId="{588B17C9-5BAC-4854-B434-75A90D9763E9}" srcOrd="0" destOrd="0" presId="urn:microsoft.com/office/officeart/2005/8/layout/cycle5"/>
     <dgm:cxn modelId="{65F218A4-6C2A-40D8-B14E-BF8DB7CFC2D7}" type="presParOf" srcId="{7923F0E7-C9DA-4D36-A324-46729F47CE0D}" destId="{CED5EF7D-F2CE-4242-A99B-3C08E54B93DC}" srcOrd="1" destOrd="0" presId="urn:microsoft.com/office/officeart/2005/8/layout/cycle5"/>
     <dgm:cxn modelId="{238388A1-7C34-498C-9842-19F53765FE9D}" type="presParOf" srcId="{7923F0E7-C9DA-4D36-A324-46729F47CE0D}" destId="{67ECA0E0-C4C4-4DB0-9F19-9B22FE2FB8B3}" srcOrd="2" destOrd="0" presId="urn:microsoft.com/office/officeart/2005/8/layout/cycle5"/>
@@ -2473,7 +3681,7 @@
         </a:bodyPr>
         <a:lstStyle/>
         <a:p>
-          <a:pPr marL="0" lvl="0" indent="0" algn="ctr" defTabSz="533400">
+          <a:pPr lvl="0" algn="ctr" defTabSz="533400">
             <a:lnSpc>
               <a:spcPct val="90000"/>
             </a:lnSpc>
@@ -2483,7 +3691,6 @@
             <a:spcAft>
               <a:spcPct val="35000"/>
             </a:spcAft>
-            <a:buNone/>
           </a:pPr>
           <a:r>
             <a:rPr lang="fr-FR" sz="1200" kern="1200" dirty="0" err="1">
@@ -2609,7 +3816,159 @@
         </a:bodyPr>
         <a:lstStyle/>
         <a:p>
-          <a:pPr marL="0" lvl="0" indent="0" algn="ctr" defTabSz="533400">
+          <a:pPr lvl="0" algn="ctr" defTabSz="533400">
+            <a:lnSpc>
+              <a:spcPct val="90000"/>
+            </a:lnSpc>
+            <a:spcBef>
+              <a:spcPct val="0"/>
+            </a:spcBef>
+            <a:spcAft>
+              <a:spcPct val="35000"/>
+            </a:spcAft>
+          </a:pPr>
+          <a:r>
+            <a:rPr lang="fr-FR" sz="1200" kern="1200" dirty="0" err="1">
+              <a:solidFill>
+                <a:prstClr val="black">
+                  <a:lumMod val="75000"/>
+                  <a:lumOff val="25000"/>
+                </a:prstClr>
+              </a:solidFill>
+              <a:latin typeface="Consolas" panose="020B0609020204030204" pitchFamily="49" charset="0"/>
+              <a:ea typeface="Verdana" panose="020B0604030504040204" pitchFamily="34" charset="0"/>
+              <a:cs typeface="Times New Roman" panose="02020603050405020304" pitchFamily="18" charset="0"/>
+            </a:rPr>
+            <a:t>Eval_output</a:t>
+          </a:r>
+          <a:endParaRPr lang="fr-FR" sz="1200" kern="1200" dirty="0">
+            <a:solidFill>
+              <a:prstClr val="black">
+                <a:lumMod val="75000"/>
+                <a:lumOff val="25000"/>
+              </a:prstClr>
+            </a:solidFill>
+            <a:latin typeface="Consolas" panose="020B0609020204030204" pitchFamily="49" charset="0"/>
+            <a:ea typeface="Verdana" panose="020B0604030504040204" pitchFamily="34" charset="0"/>
+            <a:cs typeface="Times New Roman" panose="02020603050405020304" pitchFamily="18" charset="0"/>
+          </a:endParaRPr>
+        </a:p>
+      </dsp:txBody>
+      <dsp:txXfrm>
+        <a:off x="2745369" y="2057215"/>
+        <a:ext cx="1051886" cy="259885"/>
+      </dsp:txXfrm>
+    </dsp:sp>
+    <dsp:sp modelId="{E9E59BD6-A9E3-4760-AF64-CF5F8B07EEA6}">
+      <dsp:nvSpPr>
+        <dsp:cNvPr id="0" name=""/>
+        <dsp:cNvSpPr/>
+      </dsp:nvSpPr>
+      <dsp:spPr>
+        <a:xfrm>
+          <a:off x="3122380" y="341266"/>
+          <a:ext cx="2506053" cy="2506053"/>
+        </a:xfrm>
+        <a:custGeom>
+          <a:avLst/>
+          <a:gdLst/>
+          <a:ahLst/>
+          <a:cxnLst/>
+          <a:rect l="0" t="0" r="0" b="0"/>
+          <a:pathLst>
+            <a:path>
+              <a:moveTo>
+                <a:pt x="4549" y="1359708"/>
+              </a:moveTo>
+              <a:arcTo wR="1253026" hR="1253026" stAng="10506959" swAng="3425442"/>
+            </a:path>
+          </a:pathLst>
+        </a:custGeom>
+        <a:noFill/>
+        <a:ln w="6350" cap="flat" cmpd="sng" algn="ctr">
+          <a:solidFill>
+            <a:schemeClr val="tx1"/>
+          </a:solidFill>
+          <a:prstDash val="solid"/>
+          <a:miter lim="800000"/>
+          <a:tailEnd type="triangle"/>
+        </a:ln>
+        <a:effectLst/>
+      </dsp:spPr>
+      <dsp:style>
+        <a:lnRef idx="1">
+          <a:scrgbClr r="0" g="0" b="0"/>
+        </a:lnRef>
+        <a:fillRef idx="0">
+          <a:scrgbClr r="0" g="0" b="0"/>
+        </a:fillRef>
+        <a:effectRef idx="0">
+          <a:scrgbClr r="0" g="0" b="0"/>
+        </a:effectRef>
+        <a:fontRef idx="minor"/>
+      </dsp:style>
+    </dsp:sp>
+  </dsp:spTree>
+</dsp:drawing>
+</file>
+
+<file path=ppt/diagrams/drawing2.xml><?xml version="1.0" encoding="utf-8"?>
+<dsp:drawing xmlns:dgm="http://schemas.openxmlformats.org/drawingml/2006/diagram" xmlns:dsp="http://schemas.microsoft.com/office/drawing/2008/diagram" xmlns:a="http://schemas.openxmlformats.org/drawingml/2006/main">
+  <dsp:spTree>
+    <dsp:nvGrpSpPr>
+      <dsp:cNvPr id="0" name=""/>
+      <dsp:cNvGrpSpPr/>
+    </dsp:nvGrpSpPr>
+    <dsp:grpSpPr/>
+    <dsp:sp modelId="{588B17C9-5BAC-4854-B434-75A90D9763E9}">
+      <dsp:nvSpPr>
+        <dsp:cNvPr id="0" name=""/>
+        <dsp:cNvSpPr/>
+      </dsp:nvSpPr>
+      <dsp:spPr>
+        <a:xfrm>
+          <a:off x="3912383" y="163621"/>
+          <a:ext cx="1080004" cy="288003"/>
+        </a:xfrm>
+        <a:prstGeom prst="roundRect">
+          <a:avLst/>
+        </a:prstGeom>
+        <a:solidFill>
+          <a:srgbClr val="F5F5F5"/>
+        </a:solidFill>
+        <a:ln w="12700" cap="flat" cmpd="sng" algn="ctr">
+          <a:noFill/>
+          <a:prstDash val="solid"/>
+          <a:miter lim="800000"/>
+        </a:ln>
+        <a:effectLst/>
+      </dsp:spPr>
+      <dsp:style>
+        <a:lnRef idx="2">
+          <a:schemeClr val="accent1">
+            <a:shade val="50000"/>
+          </a:schemeClr>
+        </a:lnRef>
+        <a:fillRef idx="1">
+          <a:schemeClr val="accent1"/>
+        </a:fillRef>
+        <a:effectRef idx="0">
+          <a:schemeClr val="accent1"/>
+        </a:effectRef>
+        <a:fontRef idx="minor">
+          <a:schemeClr val="lt1"/>
+        </a:fontRef>
+      </dsp:style>
+      <dsp:txBody>
+        <a:bodyPr rot="0" spcFirstLastPara="0" vertOverflow="overflow" horzOverflow="overflow" vert="horz" wrap="square" lIns="91440" tIns="45720" rIns="91440" bIns="45720" numCol="1" spcCol="1270" rtlCol="0" fromWordArt="0" anchor="ctr" anchorCtr="0" forceAA="0" compatLnSpc="1">
+          <a:prstTxWarp prst="textNoShape">
+            <a:avLst/>
+          </a:prstTxWarp>
+          <a:noAutofit/>
+        </a:bodyPr>
+        <a:lstStyle/>
+        <a:p>
+          <a:pPr marL="0" lvl="0" indent="0" algn="ctr" defTabSz="914400" rtl="0" eaLnBrk="1" latinLnBrk="0" hangingPunct="1">
             <a:lnSpc>
               <a:spcPct val="90000"/>
             </a:lnSpc>
@@ -2620,6 +3979,270 @@
               <a:spcPct val="35000"/>
             </a:spcAft>
             <a:buNone/>
+          </a:pPr>
+          <a:r>
+            <a:rPr lang="fr-FR" sz="1200" kern="1200" dirty="0" err="1">
+              <a:solidFill>
+                <a:srgbClr val="3D2E2D"/>
+              </a:solidFill>
+              <a:latin typeface="Consolas" panose="020B0609020204030204" pitchFamily="49" charset="0"/>
+              <a:ea typeface="Verdana" panose="020B0604030504040204" pitchFamily="34" charset="0"/>
+              <a:cs typeface="Times New Roman" panose="02020603050405020304" pitchFamily="18" charset="0"/>
+            </a:rPr>
+            <a:t>Set_usm</a:t>
+          </a:r>
+          <a:endParaRPr lang="fr-FR" sz="1200" kern="1200" dirty="0">
+            <a:solidFill>
+              <a:srgbClr val="3D2E2D"/>
+            </a:solidFill>
+            <a:latin typeface="Consolas" panose="020B0609020204030204" pitchFamily="49" charset="0"/>
+            <a:ea typeface="Verdana" panose="020B0604030504040204" pitchFamily="34" charset="0"/>
+            <a:cs typeface="Times New Roman" panose="02020603050405020304" pitchFamily="18" charset="0"/>
+          </a:endParaRPr>
+        </a:p>
+      </dsp:txBody>
+      <dsp:txXfrm>
+        <a:off x="3926442" y="177680"/>
+        <a:ext cx="1051886" cy="259885"/>
+      </dsp:txXfrm>
+    </dsp:sp>
+    <dsp:sp modelId="{67ECA0E0-C4C4-4DB0-9F19-9B22FE2FB8B3}">
+      <dsp:nvSpPr>
+        <dsp:cNvPr id="0" name=""/>
+        <dsp:cNvSpPr/>
+      </dsp:nvSpPr>
+      <dsp:spPr>
+        <a:xfrm>
+          <a:off x="3295624" y="348752"/>
+          <a:ext cx="2506053" cy="2506053"/>
+        </a:xfrm>
+        <a:custGeom>
+          <a:avLst/>
+          <a:gdLst/>
+          <a:ahLst/>
+          <a:cxnLst/>
+          <a:rect l="0" t="0" r="0" b="0"/>
+          <a:pathLst>
+            <a:path>
+              <a:moveTo>
+                <a:pt x="2005888" y="251390"/>
+              </a:moveTo>
+              <a:arcTo wR="1253026" hR="1253026" stAng="18415783" swAng="3450372"/>
+            </a:path>
+          </a:pathLst>
+        </a:custGeom>
+        <a:noFill/>
+        <a:ln w="6350" cap="flat" cmpd="sng" algn="ctr">
+          <a:solidFill>
+            <a:schemeClr val="tx1"/>
+          </a:solidFill>
+          <a:prstDash val="solid"/>
+          <a:miter lim="800000"/>
+          <a:tailEnd type="triangle"/>
+        </a:ln>
+        <a:effectLst/>
+      </dsp:spPr>
+      <dsp:style>
+        <a:lnRef idx="1">
+          <a:scrgbClr r="0" g="0" b="0"/>
+        </a:lnRef>
+        <a:fillRef idx="0">
+          <a:scrgbClr r="0" g="0" b="0"/>
+        </a:fillRef>
+        <a:effectRef idx="0">
+          <a:scrgbClr r="0" g="0" b="0"/>
+        </a:effectRef>
+        <a:fontRef idx="minor"/>
+      </dsp:style>
+    </dsp:sp>
+    <dsp:sp modelId="{257FD812-0516-4ABB-9FDD-73A119FBD787}">
+      <dsp:nvSpPr>
+        <dsp:cNvPr id="0" name=""/>
+        <dsp:cNvSpPr/>
+      </dsp:nvSpPr>
+      <dsp:spPr>
+        <a:xfrm>
+          <a:off x="5116792" y="2043164"/>
+          <a:ext cx="1080004" cy="288003"/>
+        </a:xfrm>
+        <a:prstGeom prst="roundRect">
+          <a:avLst/>
+        </a:prstGeom>
+        <a:solidFill>
+          <a:srgbClr val="F5F5F5"/>
+        </a:solidFill>
+        <a:ln w="12700" cap="flat" cmpd="sng" algn="ctr">
+          <a:noFill/>
+          <a:prstDash val="solid"/>
+          <a:miter lim="800000"/>
+        </a:ln>
+        <a:effectLst/>
+      </dsp:spPr>
+      <dsp:style>
+        <a:lnRef idx="2">
+          <a:scrgbClr r="0" g="0" b="0"/>
+        </a:lnRef>
+        <a:fillRef idx="1">
+          <a:scrgbClr r="0" g="0" b="0"/>
+        </a:fillRef>
+        <a:effectRef idx="0">
+          <a:scrgbClr r="0" g="0" b="0"/>
+        </a:effectRef>
+        <a:fontRef idx="minor">
+          <a:schemeClr val="lt1"/>
+        </a:fontRef>
+      </dsp:style>
+      <dsp:txBody>
+        <a:bodyPr spcFirstLastPara="0" vert="horz" wrap="square" lIns="45720" tIns="45720" rIns="45720" bIns="45720" numCol="1" spcCol="1270" anchor="ctr" anchorCtr="0">
+          <a:noAutofit/>
+        </a:bodyPr>
+        <a:lstStyle/>
+        <a:p>
+          <a:pPr lvl="0" algn="ctr" defTabSz="533400">
+            <a:lnSpc>
+              <a:spcPct val="90000"/>
+            </a:lnSpc>
+            <a:spcBef>
+              <a:spcPct val="0"/>
+            </a:spcBef>
+            <a:spcAft>
+              <a:spcPct val="35000"/>
+            </a:spcAft>
+          </a:pPr>
+          <a:r>
+            <a:rPr lang="fr-FR" sz="1200" kern="1200" dirty="0" err="1">
+              <a:solidFill>
+                <a:prstClr val="black">
+                  <a:lumMod val="75000"/>
+                  <a:lumOff val="25000"/>
+                </a:prstClr>
+              </a:solidFill>
+              <a:latin typeface="Consolas" panose="020B0609020204030204" pitchFamily="49" charset="0"/>
+              <a:ea typeface="Verdana" panose="020B0604030504040204" pitchFamily="34" charset="0"/>
+              <a:cs typeface="Times New Roman" panose="02020603050405020304" pitchFamily="18" charset="0"/>
+            </a:rPr>
+            <a:t>Run_stics</a:t>
+          </a:r>
+          <a:endParaRPr lang="fr-FR" sz="1200" kern="1200" dirty="0">
+            <a:solidFill>
+              <a:prstClr val="black">
+                <a:lumMod val="75000"/>
+                <a:lumOff val="25000"/>
+              </a:prstClr>
+            </a:solidFill>
+            <a:latin typeface="Consolas" panose="020B0609020204030204" pitchFamily="49" charset="0"/>
+            <a:ea typeface="Verdana" panose="020B0604030504040204" pitchFamily="34" charset="0"/>
+            <a:cs typeface="Times New Roman" panose="02020603050405020304" pitchFamily="18" charset="0"/>
+          </a:endParaRPr>
+        </a:p>
+      </dsp:txBody>
+      <dsp:txXfrm>
+        <a:off x="5130851" y="2057223"/>
+        <a:ext cx="1051886" cy="259885"/>
+      </dsp:txXfrm>
+    </dsp:sp>
+    <dsp:sp modelId="{98DA5AEB-0972-4B65-B097-DC55B46EC5C2}">
+      <dsp:nvSpPr>
+        <dsp:cNvPr id="0" name=""/>
+        <dsp:cNvSpPr/>
+      </dsp:nvSpPr>
+      <dsp:spPr>
+        <a:xfrm>
+          <a:off x="3211953" y="487679"/>
+          <a:ext cx="2506053" cy="2506053"/>
+        </a:xfrm>
+        <a:custGeom>
+          <a:avLst/>
+          <a:gdLst/>
+          <a:ahLst/>
+          <a:cxnLst/>
+          <a:rect l="0" t="0" r="0" b="0"/>
+          <a:pathLst>
+            <a:path>
+              <a:moveTo>
+                <a:pt x="2086115" y="2188996"/>
+              </a:moveTo>
+              <a:arcTo wR="1253026" hR="1253026" stAng="2899700" swAng="5000626"/>
+            </a:path>
+          </a:pathLst>
+        </a:custGeom>
+        <a:noFill/>
+        <a:ln w="6350" cap="flat" cmpd="sng" algn="ctr">
+          <a:solidFill>
+            <a:schemeClr val="tx1"/>
+          </a:solidFill>
+          <a:prstDash val="solid"/>
+          <a:miter lim="800000"/>
+          <a:tailEnd type="triangle"/>
+        </a:ln>
+        <a:effectLst/>
+      </dsp:spPr>
+      <dsp:style>
+        <a:lnRef idx="1">
+          <a:scrgbClr r="0" g="0" b="0"/>
+        </a:lnRef>
+        <a:fillRef idx="0">
+          <a:scrgbClr r="0" g="0" b="0"/>
+        </a:fillRef>
+        <a:effectRef idx="0">
+          <a:scrgbClr r="0" g="0" b="0"/>
+        </a:effectRef>
+        <a:fontRef idx="minor"/>
+      </dsp:style>
+    </dsp:sp>
+    <dsp:sp modelId="{0A63F788-CDF4-414E-8169-F1D6559D957B}">
+      <dsp:nvSpPr>
+        <dsp:cNvPr id="0" name=""/>
+        <dsp:cNvSpPr/>
+      </dsp:nvSpPr>
+      <dsp:spPr>
+        <a:xfrm>
+          <a:off x="2731310" y="2043156"/>
+          <a:ext cx="1080004" cy="288003"/>
+        </a:xfrm>
+        <a:prstGeom prst="roundRect">
+          <a:avLst/>
+        </a:prstGeom>
+        <a:solidFill>
+          <a:srgbClr val="F5F5F5"/>
+        </a:solidFill>
+        <a:ln w="12700" cap="flat" cmpd="sng" algn="ctr">
+          <a:noFill/>
+          <a:prstDash val="solid"/>
+          <a:miter lim="800000"/>
+        </a:ln>
+        <a:effectLst/>
+      </dsp:spPr>
+      <dsp:style>
+        <a:lnRef idx="2">
+          <a:scrgbClr r="0" g="0" b="0"/>
+        </a:lnRef>
+        <a:fillRef idx="1">
+          <a:scrgbClr r="0" g="0" b="0"/>
+        </a:fillRef>
+        <a:effectRef idx="0">
+          <a:scrgbClr r="0" g="0" b="0"/>
+        </a:effectRef>
+        <a:fontRef idx="minor">
+          <a:schemeClr val="lt1"/>
+        </a:fontRef>
+      </dsp:style>
+      <dsp:txBody>
+        <a:bodyPr spcFirstLastPara="0" vert="horz" wrap="square" lIns="45720" tIns="45720" rIns="45720" bIns="45720" numCol="1" spcCol="1270" anchor="ctr" anchorCtr="0">
+          <a:noAutofit/>
+        </a:bodyPr>
+        <a:lstStyle/>
+        <a:p>
+          <a:pPr lvl="0" algn="ctr" defTabSz="533400">
+            <a:lnSpc>
+              <a:spcPct val="90000"/>
+            </a:lnSpc>
+            <a:spcBef>
+              <a:spcPct val="0"/>
+            </a:spcBef>
+            <a:spcAft>
+              <a:spcPct val="35000"/>
+            </a:spcAft>
           </a:pPr>
           <a:r>
             <a:rPr lang="fr-FR" sz="1200" kern="1200" dirty="0" err="1">
@@ -2914,7 +4537,1249 @@
 </dgm:layoutDef>
 </file>
 
+<file path=ppt/diagrams/layout2.xml><?xml version="1.0" encoding="utf-8"?>
+<dgm:layoutDef xmlns:dgm="http://schemas.openxmlformats.org/drawingml/2006/diagram" xmlns:a="http://schemas.openxmlformats.org/drawingml/2006/main" uniqueId="urn:microsoft.com/office/officeart/2005/8/layout/cycle5">
+  <dgm:title val=""/>
+  <dgm:desc val=""/>
+  <dgm:catLst>
+    <dgm:cat type="cycle" pri="3000"/>
+  </dgm:catLst>
+  <dgm:sampData>
+    <dgm:dataModel>
+      <dgm:ptLst>
+        <dgm:pt modelId="0" type="doc"/>
+        <dgm:pt modelId="1">
+          <dgm:prSet phldr="1"/>
+        </dgm:pt>
+        <dgm:pt modelId="2">
+          <dgm:prSet phldr="1"/>
+        </dgm:pt>
+        <dgm:pt modelId="3">
+          <dgm:prSet phldr="1"/>
+        </dgm:pt>
+        <dgm:pt modelId="4">
+          <dgm:prSet phldr="1"/>
+        </dgm:pt>
+        <dgm:pt modelId="5">
+          <dgm:prSet phldr="1"/>
+        </dgm:pt>
+      </dgm:ptLst>
+      <dgm:cxnLst>
+        <dgm:cxn modelId="6" srcId="0" destId="1" srcOrd="0" destOrd="0"/>
+        <dgm:cxn modelId="7" srcId="0" destId="2" srcOrd="1" destOrd="0"/>
+        <dgm:cxn modelId="8" srcId="0" destId="3" srcOrd="2" destOrd="0"/>
+        <dgm:cxn modelId="9" srcId="0" destId="4" srcOrd="3" destOrd="0"/>
+        <dgm:cxn modelId="10" srcId="0" destId="5" srcOrd="4" destOrd="0"/>
+      </dgm:cxnLst>
+      <dgm:bg/>
+      <dgm:whole/>
+    </dgm:dataModel>
+  </dgm:sampData>
+  <dgm:styleData>
+    <dgm:dataModel>
+      <dgm:ptLst>
+        <dgm:pt modelId="0" type="doc"/>
+        <dgm:pt modelId="1"/>
+        <dgm:pt modelId="2"/>
+        <dgm:pt modelId="3"/>
+      </dgm:ptLst>
+      <dgm:cxnLst>
+        <dgm:cxn modelId="4" srcId="0" destId="1" srcOrd="0" destOrd="0"/>
+        <dgm:cxn modelId="5" srcId="0" destId="2" srcOrd="1" destOrd="0"/>
+        <dgm:cxn modelId="6" srcId="0" destId="3" srcOrd="2" destOrd="0"/>
+      </dgm:cxnLst>
+      <dgm:bg/>
+      <dgm:whole/>
+    </dgm:dataModel>
+  </dgm:styleData>
+  <dgm:clrData>
+    <dgm:dataModel>
+      <dgm:ptLst>
+        <dgm:pt modelId="0" type="doc"/>
+        <dgm:pt modelId="1"/>
+        <dgm:pt modelId="2"/>
+        <dgm:pt modelId="3"/>
+        <dgm:pt modelId="4"/>
+        <dgm:pt modelId="5"/>
+        <dgm:pt modelId="6"/>
+      </dgm:ptLst>
+      <dgm:cxnLst>
+        <dgm:cxn modelId="7" srcId="0" destId="1" srcOrd="0" destOrd="0"/>
+        <dgm:cxn modelId="8" srcId="0" destId="2" srcOrd="1" destOrd="0"/>
+        <dgm:cxn modelId="9" srcId="0" destId="3" srcOrd="2" destOrd="0"/>
+        <dgm:cxn modelId="10" srcId="0" destId="4" srcOrd="3" destOrd="0"/>
+        <dgm:cxn modelId="11" srcId="0" destId="5" srcOrd="4" destOrd="0"/>
+        <dgm:cxn modelId="12" srcId="0" destId="6" srcOrd="5" destOrd="0"/>
+      </dgm:cxnLst>
+      <dgm:bg/>
+      <dgm:whole/>
+    </dgm:dataModel>
+  </dgm:clrData>
+  <dgm:layoutNode name="cycle">
+    <dgm:varLst>
+      <dgm:dir/>
+      <dgm:resizeHandles val="exact"/>
+    </dgm:varLst>
+    <dgm:choose name="Name0">
+      <dgm:if name="Name1" func="var" arg="dir" op="equ" val="norm">
+        <dgm:choose name="Name2">
+          <dgm:if name="Name3" axis="ch" ptType="node" func="cnt" op="gt" val="2">
+            <dgm:alg type="cycle">
+              <dgm:param type="stAng" val="0"/>
+              <dgm:param type="spanAng" val="360"/>
+            </dgm:alg>
+          </dgm:if>
+          <dgm:else name="Name4">
+            <dgm:alg type="cycle">
+              <dgm:param type="stAng" val="-90"/>
+              <dgm:param type="spanAng" val="360"/>
+            </dgm:alg>
+          </dgm:else>
+        </dgm:choose>
+      </dgm:if>
+      <dgm:else name="Name5">
+        <dgm:choose name="Name6">
+          <dgm:if name="Name7" axis="ch" ptType="node" func="cnt" op="gt" val="2">
+            <dgm:alg type="cycle">
+              <dgm:param type="stAng" val="0"/>
+              <dgm:param type="spanAng" val="-360"/>
+            </dgm:alg>
+          </dgm:if>
+          <dgm:else name="Name8">
+            <dgm:alg type="cycle">
+              <dgm:param type="stAng" val="90"/>
+              <dgm:param type="spanAng" val="-360"/>
+            </dgm:alg>
+          </dgm:else>
+        </dgm:choose>
+      </dgm:else>
+    </dgm:choose>
+    <dgm:shape xmlns:r="http://schemas.openxmlformats.org/officeDocument/2006/relationships" r:blip="">
+      <dgm:adjLst/>
+    </dgm:shape>
+    <dgm:presOf/>
+    <dgm:choose name="Name9">
+      <dgm:if name="Name10" func="var" arg="dir" op="equ" val="norm">
+        <dgm:constrLst>
+          <dgm:constr type="w" for="ch" forName="node" refType="w"/>
+          <dgm:constr type="w" for="ch" ptType="sibTrans" refType="w" refFor="ch" refForName="node" op="equ" fact="0.3"/>
+          <dgm:constr type="diam" for="ch" ptType="sibTrans" refType="diam" op="equ"/>
+          <dgm:constr type="sibSp" refType="w" refFor="ch" refForName="node" op="equ" fact="0.15"/>
+          <dgm:constr type="w" for="ch" forName="spNode" refType="sibSp" fact="1.6"/>
+          <dgm:constr type="primFontSz" for="ch" forName="node" op="equ" val="65"/>
+        </dgm:constrLst>
+      </dgm:if>
+      <dgm:else name="Name11">
+        <dgm:constrLst>
+          <dgm:constr type="w" for="ch" forName="node" refType="w"/>
+          <dgm:constr type="w" for="ch" ptType="sibTrans" refType="w" refFor="ch" refForName="node" op="equ" fact="0.3"/>
+          <dgm:constr type="diam" for="ch" ptType="sibTrans" refType="diam" fact="-1"/>
+          <dgm:constr type="diam" for="ch" refType="diam" op="equ" fact="-1"/>
+          <dgm:constr type="sibSp" refType="w" refFor="ch" refForName="node" op="equ" fact="0.15"/>
+          <dgm:constr type="w" for="ch" forName="spNode" refType="sibSp" fact="1.6"/>
+          <dgm:constr type="primFontSz" for="ch" forName="node" op="equ" val="65"/>
+        </dgm:constrLst>
+      </dgm:else>
+    </dgm:choose>
+    <dgm:ruleLst/>
+    <dgm:forEach name="Name12" axis="ch" ptType="node">
+      <dgm:layoutNode name="node">
+        <dgm:varLst>
+          <dgm:bulletEnabled val="1"/>
+        </dgm:varLst>
+        <dgm:alg type="tx"/>
+        <dgm:shape xmlns:r="http://schemas.openxmlformats.org/officeDocument/2006/relationships" type="roundRect" r:blip="">
+          <dgm:adjLst/>
+        </dgm:shape>
+        <dgm:presOf axis="desOrSelf" ptType="node"/>
+        <dgm:constrLst>
+          <dgm:constr type="h" refType="w" fact="0.65"/>
+          <dgm:constr type="tMarg" refType="primFontSz" fact="0.3"/>
+          <dgm:constr type="bMarg" refType="primFontSz" fact="0.3"/>
+          <dgm:constr type="lMarg" refType="primFontSz" fact="0.3"/>
+          <dgm:constr type="rMarg" refType="primFontSz" fact="0.3"/>
+        </dgm:constrLst>
+        <dgm:ruleLst>
+          <dgm:rule type="primFontSz" val="5" fact="NaN" max="NaN"/>
+        </dgm:ruleLst>
+      </dgm:layoutNode>
+      <dgm:choose name="Name13">
+        <dgm:if name="Name14" axis="par ch" ptType="doc node" func="cnt" op="gt" val="1">
+          <dgm:layoutNode name="spNode">
+            <dgm:alg type="sp"/>
+            <dgm:shape xmlns:r="http://schemas.openxmlformats.org/officeDocument/2006/relationships" r:blip="">
+              <dgm:adjLst/>
+            </dgm:shape>
+            <dgm:presOf/>
+            <dgm:constrLst>
+              <dgm:constr type="h" refType="w"/>
+            </dgm:constrLst>
+            <dgm:ruleLst/>
+          </dgm:layoutNode>
+          <dgm:forEach name="Name15" axis="followSib" ptType="sibTrans" hideLastTrans="0" cnt="1">
+            <dgm:layoutNode name="sibTrans">
+              <dgm:alg type="conn">
+                <dgm:param type="dim" val="1D"/>
+                <dgm:param type="connRout" val="curve"/>
+                <dgm:param type="begPts" val="radial"/>
+                <dgm:param type="endPts" val="radial"/>
+              </dgm:alg>
+              <dgm:shape xmlns:r="http://schemas.openxmlformats.org/officeDocument/2006/relationships" type="conn" r:blip="">
+                <dgm:adjLst/>
+              </dgm:shape>
+              <dgm:presOf axis="self"/>
+              <dgm:constrLst>
+                <dgm:constr type="h" refType="w" fact="0.65"/>
+                <dgm:constr type="connDist"/>
+                <dgm:constr type="begPad" refType="connDist" fact="0.2"/>
+                <dgm:constr type="endPad" refType="connDist" fact="0.2"/>
+              </dgm:constrLst>
+              <dgm:ruleLst/>
+            </dgm:layoutNode>
+          </dgm:forEach>
+        </dgm:if>
+        <dgm:else name="Name16"/>
+      </dgm:choose>
+    </dgm:forEach>
+  </dgm:layoutNode>
+</dgm:layoutDef>
+</file>
+
 <file path=ppt/diagrams/quickStyle1.xml><?xml version="1.0" encoding="utf-8"?>
+<dgm:styleDef xmlns:dgm="http://schemas.openxmlformats.org/drawingml/2006/diagram" xmlns:a="http://schemas.openxmlformats.org/drawingml/2006/main" uniqueId="urn:microsoft.com/office/officeart/2005/8/quickstyle/simple1">
+  <dgm:title val=""/>
+  <dgm:desc val=""/>
+  <dgm:catLst>
+    <dgm:cat type="simple" pri="10100"/>
+  </dgm:catLst>
+  <dgm:scene3d>
+    <a:camera prst="orthographicFront"/>
+    <a:lightRig rig="threePt" dir="t"/>
+  </dgm:scene3d>
+  <dgm:styleLbl name="node0">
+    <dgm:scene3d>
+      <a:camera prst="orthographicFront"/>
+      <a:lightRig rig="threePt" dir="t"/>
+    </dgm:scene3d>
+    <dgm:sp3d/>
+    <dgm:txPr/>
+    <dgm:style>
+      <a:lnRef idx="2">
+        <a:scrgbClr r="0" g="0" b="0"/>
+      </a:lnRef>
+      <a:fillRef idx="1">
+        <a:scrgbClr r="0" g="0" b="0"/>
+      </a:fillRef>
+      <a:effectRef idx="0">
+        <a:scrgbClr r="0" g="0" b="0"/>
+      </a:effectRef>
+      <a:fontRef idx="minor">
+        <a:schemeClr val="lt1"/>
+      </a:fontRef>
+    </dgm:style>
+  </dgm:styleLbl>
+  <dgm:styleLbl name="lnNode1">
+    <dgm:scene3d>
+      <a:camera prst="orthographicFront"/>
+      <a:lightRig rig="threePt" dir="t"/>
+    </dgm:scene3d>
+    <dgm:sp3d/>
+    <dgm:txPr/>
+    <dgm:style>
+      <a:lnRef idx="2">
+        <a:scrgbClr r="0" g="0" b="0"/>
+      </a:lnRef>
+      <a:fillRef idx="1">
+        <a:scrgbClr r="0" g="0" b="0"/>
+      </a:fillRef>
+      <a:effectRef idx="0">
+        <a:scrgbClr r="0" g="0" b="0"/>
+      </a:effectRef>
+      <a:fontRef idx="minor">
+        <a:schemeClr val="lt1"/>
+      </a:fontRef>
+    </dgm:style>
+  </dgm:styleLbl>
+  <dgm:styleLbl name="vennNode1">
+    <dgm:scene3d>
+      <a:camera prst="orthographicFront"/>
+      <a:lightRig rig="threePt" dir="t"/>
+    </dgm:scene3d>
+    <dgm:sp3d/>
+    <dgm:txPr/>
+    <dgm:style>
+      <a:lnRef idx="2">
+        <a:scrgbClr r="0" g="0" b="0"/>
+      </a:lnRef>
+      <a:fillRef idx="1">
+        <a:scrgbClr r="0" g="0" b="0"/>
+      </a:fillRef>
+      <a:effectRef idx="0">
+        <a:scrgbClr r="0" g="0" b="0"/>
+      </a:effectRef>
+      <a:fontRef idx="minor">
+        <a:schemeClr val="tx1"/>
+      </a:fontRef>
+    </dgm:style>
+  </dgm:styleLbl>
+  <dgm:styleLbl name="alignNode1">
+    <dgm:scene3d>
+      <a:camera prst="orthographicFront"/>
+      <a:lightRig rig="threePt" dir="t"/>
+    </dgm:scene3d>
+    <dgm:sp3d/>
+    <dgm:txPr/>
+    <dgm:style>
+      <a:lnRef idx="2">
+        <a:scrgbClr r="0" g="0" b="0"/>
+      </a:lnRef>
+      <a:fillRef idx="1">
+        <a:scrgbClr r="0" g="0" b="0"/>
+      </a:fillRef>
+      <a:effectRef idx="0">
+        <a:scrgbClr r="0" g="0" b="0"/>
+      </a:effectRef>
+      <a:fontRef idx="minor">
+        <a:schemeClr val="lt1"/>
+      </a:fontRef>
+    </dgm:style>
+  </dgm:styleLbl>
+  <dgm:styleLbl name="node1">
+    <dgm:scene3d>
+      <a:camera prst="orthographicFront"/>
+      <a:lightRig rig="threePt" dir="t"/>
+    </dgm:scene3d>
+    <dgm:sp3d/>
+    <dgm:txPr/>
+    <dgm:style>
+      <a:lnRef idx="2">
+        <a:scrgbClr r="0" g="0" b="0"/>
+      </a:lnRef>
+      <a:fillRef idx="1">
+        <a:scrgbClr r="0" g="0" b="0"/>
+      </a:fillRef>
+      <a:effectRef idx="0">
+        <a:scrgbClr r="0" g="0" b="0"/>
+      </a:effectRef>
+      <a:fontRef idx="minor">
+        <a:schemeClr val="lt1"/>
+      </a:fontRef>
+    </dgm:style>
+  </dgm:styleLbl>
+  <dgm:styleLbl name="node2">
+    <dgm:scene3d>
+      <a:camera prst="orthographicFront"/>
+      <a:lightRig rig="threePt" dir="t"/>
+    </dgm:scene3d>
+    <dgm:sp3d/>
+    <dgm:txPr/>
+    <dgm:style>
+      <a:lnRef idx="2">
+        <a:scrgbClr r="0" g="0" b="0"/>
+      </a:lnRef>
+      <a:fillRef idx="1">
+        <a:scrgbClr r="0" g="0" b="0"/>
+      </a:fillRef>
+      <a:effectRef idx="0">
+        <a:scrgbClr r="0" g="0" b="0"/>
+      </a:effectRef>
+      <a:fontRef idx="minor">
+        <a:schemeClr val="lt1"/>
+      </a:fontRef>
+    </dgm:style>
+  </dgm:styleLbl>
+  <dgm:styleLbl name="node3">
+    <dgm:scene3d>
+      <a:camera prst="orthographicFront"/>
+      <a:lightRig rig="threePt" dir="t"/>
+    </dgm:scene3d>
+    <dgm:sp3d/>
+    <dgm:txPr/>
+    <dgm:style>
+      <a:lnRef idx="2">
+        <a:scrgbClr r="0" g="0" b="0"/>
+      </a:lnRef>
+      <a:fillRef idx="1">
+        <a:scrgbClr r="0" g="0" b="0"/>
+      </a:fillRef>
+      <a:effectRef idx="0">
+        <a:scrgbClr r="0" g="0" b="0"/>
+      </a:effectRef>
+      <a:fontRef idx="minor">
+        <a:schemeClr val="lt1"/>
+      </a:fontRef>
+    </dgm:style>
+  </dgm:styleLbl>
+  <dgm:styleLbl name="node4">
+    <dgm:scene3d>
+      <a:camera prst="orthographicFront"/>
+      <a:lightRig rig="threePt" dir="t"/>
+    </dgm:scene3d>
+    <dgm:sp3d/>
+    <dgm:txPr/>
+    <dgm:style>
+      <a:lnRef idx="2">
+        <a:scrgbClr r="0" g="0" b="0"/>
+      </a:lnRef>
+      <a:fillRef idx="1">
+        <a:scrgbClr r="0" g="0" b="0"/>
+      </a:fillRef>
+      <a:effectRef idx="0">
+        <a:scrgbClr r="0" g="0" b="0"/>
+      </a:effectRef>
+      <a:fontRef idx="minor">
+        <a:schemeClr val="lt1"/>
+      </a:fontRef>
+    </dgm:style>
+  </dgm:styleLbl>
+  <dgm:styleLbl name="fgImgPlace1">
+    <dgm:scene3d>
+      <a:camera prst="orthographicFront"/>
+      <a:lightRig rig="threePt" dir="t"/>
+    </dgm:scene3d>
+    <dgm:sp3d/>
+    <dgm:txPr/>
+    <dgm:style>
+      <a:lnRef idx="2">
+        <a:scrgbClr r="0" g="0" b="0"/>
+      </a:lnRef>
+      <a:fillRef idx="1">
+        <a:scrgbClr r="0" g="0" b="0"/>
+      </a:fillRef>
+      <a:effectRef idx="0">
+        <a:scrgbClr r="0" g="0" b="0"/>
+      </a:effectRef>
+      <a:fontRef idx="minor"/>
+    </dgm:style>
+  </dgm:styleLbl>
+  <dgm:styleLbl name="alignImgPlace1">
+    <dgm:scene3d>
+      <a:camera prst="orthographicFront"/>
+      <a:lightRig rig="threePt" dir="t"/>
+    </dgm:scene3d>
+    <dgm:sp3d/>
+    <dgm:txPr/>
+    <dgm:style>
+      <a:lnRef idx="2">
+        <a:scrgbClr r="0" g="0" b="0"/>
+      </a:lnRef>
+      <a:fillRef idx="1">
+        <a:scrgbClr r="0" g="0" b="0"/>
+      </a:fillRef>
+      <a:effectRef idx="0">
+        <a:scrgbClr r="0" g="0" b="0"/>
+      </a:effectRef>
+      <a:fontRef idx="minor"/>
+    </dgm:style>
+  </dgm:styleLbl>
+  <dgm:styleLbl name="bgImgPlace1">
+    <dgm:scene3d>
+      <a:camera prst="orthographicFront"/>
+      <a:lightRig rig="threePt" dir="t"/>
+    </dgm:scene3d>
+    <dgm:sp3d/>
+    <dgm:txPr/>
+    <dgm:style>
+      <a:lnRef idx="2">
+        <a:scrgbClr r="0" g="0" b="0"/>
+      </a:lnRef>
+      <a:fillRef idx="1">
+        <a:scrgbClr r="0" g="0" b="0"/>
+      </a:fillRef>
+      <a:effectRef idx="0">
+        <a:scrgbClr r="0" g="0" b="0"/>
+      </a:effectRef>
+      <a:fontRef idx="minor"/>
+    </dgm:style>
+  </dgm:styleLbl>
+  <dgm:styleLbl name="sibTrans2D1">
+    <dgm:scene3d>
+      <a:camera prst="orthographicFront"/>
+      <a:lightRig rig="threePt" dir="t"/>
+    </dgm:scene3d>
+    <dgm:sp3d/>
+    <dgm:txPr/>
+    <dgm:style>
+      <a:lnRef idx="0">
+        <a:scrgbClr r="0" g="0" b="0"/>
+      </a:lnRef>
+      <a:fillRef idx="1">
+        <a:scrgbClr r="0" g="0" b="0"/>
+      </a:fillRef>
+      <a:effectRef idx="0">
+        <a:scrgbClr r="0" g="0" b="0"/>
+      </a:effectRef>
+      <a:fontRef idx="minor">
+        <a:schemeClr val="lt1"/>
+      </a:fontRef>
+    </dgm:style>
+  </dgm:styleLbl>
+  <dgm:styleLbl name="fgSibTrans2D1">
+    <dgm:scene3d>
+      <a:camera prst="orthographicFront"/>
+      <a:lightRig rig="threePt" dir="t"/>
+    </dgm:scene3d>
+    <dgm:sp3d/>
+    <dgm:txPr/>
+    <dgm:style>
+      <a:lnRef idx="0">
+        <a:scrgbClr r="0" g="0" b="0"/>
+      </a:lnRef>
+      <a:fillRef idx="1">
+        <a:scrgbClr r="0" g="0" b="0"/>
+      </a:fillRef>
+      <a:effectRef idx="0">
+        <a:scrgbClr r="0" g="0" b="0"/>
+      </a:effectRef>
+      <a:fontRef idx="minor">
+        <a:schemeClr val="lt1"/>
+      </a:fontRef>
+    </dgm:style>
+  </dgm:styleLbl>
+  <dgm:styleLbl name="bgSibTrans2D1">
+    <dgm:scene3d>
+      <a:camera prst="orthographicFront"/>
+      <a:lightRig rig="threePt" dir="t"/>
+    </dgm:scene3d>
+    <dgm:sp3d/>
+    <dgm:txPr/>
+    <dgm:style>
+      <a:lnRef idx="0">
+        <a:scrgbClr r="0" g="0" b="0"/>
+      </a:lnRef>
+      <a:fillRef idx="1">
+        <a:scrgbClr r="0" g="0" b="0"/>
+      </a:fillRef>
+      <a:effectRef idx="0">
+        <a:scrgbClr r="0" g="0" b="0"/>
+      </a:effectRef>
+      <a:fontRef idx="minor">
+        <a:schemeClr val="lt1"/>
+      </a:fontRef>
+    </dgm:style>
+  </dgm:styleLbl>
+  <dgm:styleLbl name="sibTrans1D1">
+    <dgm:scene3d>
+      <a:camera prst="orthographicFront"/>
+      <a:lightRig rig="threePt" dir="t"/>
+    </dgm:scene3d>
+    <dgm:sp3d/>
+    <dgm:txPr/>
+    <dgm:style>
+      <a:lnRef idx="1">
+        <a:scrgbClr r="0" g="0" b="0"/>
+      </a:lnRef>
+      <a:fillRef idx="0">
+        <a:scrgbClr r="0" g="0" b="0"/>
+      </a:fillRef>
+      <a:effectRef idx="0">
+        <a:scrgbClr r="0" g="0" b="0"/>
+      </a:effectRef>
+      <a:fontRef idx="minor"/>
+    </dgm:style>
+  </dgm:styleLbl>
+  <dgm:styleLbl name="callout">
+    <dgm:scene3d>
+      <a:camera prst="orthographicFront"/>
+      <a:lightRig rig="threePt" dir="t"/>
+    </dgm:scene3d>
+    <dgm:sp3d/>
+    <dgm:txPr/>
+    <dgm:style>
+      <a:lnRef idx="2">
+        <a:scrgbClr r="0" g="0" b="0"/>
+      </a:lnRef>
+      <a:fillRef idx="1">
+        <a:scrgbClr r="0" g="0" b="0"/>
+      </a:fillRef>
+      <a:effectRef idx="0">
+        <a:scrgbClr r="0" g="0" b="0"/>
+      </a:effectRef>
+      <a:fontRef idx="minor"/>
+    </dgm:style>
+  </dgm:styleLbl>
+  <dgm:styleLbl name="asst0">
+    <dgm:scene3d>
+      <a:camera prst="orthographicFront"/>
+      <a:lightRig rig="threePt" dir="t"/>
+    </dgm:scene3d>
+    <dgm:sp3d/>
+    <dgm:txPr/>
+    <dgm:style>
+      <a:lnRef idx="2">
+        <a:scrgbClr r="0" g="0" b="0"/>
+      </a:lnRef>
+      <a:fillRef idx="1">
+        <a:scrgbClr r="0" g="0" b="0"/>
+      </a:fillRef>
+      <a:effectRef idx="0">
+        <a:scrgbClr r="0" g="0" b="0"/>
+      </a:effectRef>
+      <a:fontRef idx="minor">
+        <a:schemeClr val="lt1"/>
+      </a:fontRef>
+    </dgm:style>
+  </dgm:styleLbl>
+  <dgm:styleLbl name="asst1">
+    <dgm:scene3d>
+      <a:camera prst="orthographicFront"/>
+      <a:lightRig rig="threePt" dir="t"/>
+    </dgm:scene3d>
+    <dgm:sp3d/>
+    <dgm:txPr/>
+    <dgm:style>
+      <a:lnRef idx="2">
+        <a:scrgbClr r="0" g="0" b="0"/>
+      </a:lnRef>
+      <a:fillRef idx="1">
+        <a:scrgbClr r="0" g="0" b="0"/>
+      </a:fillRef>
+      <a:effectRef idx="0">
+        <a:scrgbClr r="0" g="0" b="0"/>
+      </a:effectRef>
+      <a:fontRef idx="minor">
+        <a:schemeClr val="lt1"/>
+      </a:fontRef>
+    </dgm:style>
+  </dgm:styleLbl>
+  <dgm:styleLbl name="asst2">
+    <dgm:scene3d>
+      <a:camera prst="orthographicFront"/>
+      <a:lightRig rig="threePt" dir="t"/>
+    </dgm:scene3d>
+    <dgm:sp3d/>
+    <dgm:txPr/>
+    <dgm:style>
+      <a:lnRef idx="2">
+        <a:scrgbClr r="0" g="0" b="0"/>
+      </a:lnRef>
+      <a:fillRef idx="1">
+        <a:scrgbClr r="0" g="0" b="0"/>
+      </a:fillRef>
+      <a:effectRef idx="0">
+        <a:scrgbClr r="0" g="0" b="0"/>
+      </a:effectRef>
+      <a:fontRef idx="minor">
+        <a:schemeClr val="lt1"/>
+      </a:fontRef>
+    </dgm:style>
+  </dgm:styleLbl>
+  <dgm:styleLbl name="asst3">
+    <dgm:scene3d>
+      <a:camera prst="orthographicFront"/>
+      <a:lightRig rig="threePt" dir="t"/>
+    </dgm:scene3d>
+    <dgm:sp3d/>
+    <dgm:txPr/>
+    <dgm:style>
+      <a:lnRef idx="2">
+        <a:scrgbClr r="0" g="0" b="0"/>
+      </a:lnRef>
+      <a:fillRef idx="1">
+        <a:scrgbClr r="0" g="0" b="0"/>
+      </a:fillRef>
+      <a:effectRef idx="0">
+        <a:scrgbClr r="0" g="0" b="0"/>
+      </a:effectRef>
+      <a:fontRef idx="minor">
+        <a:schemeClr val="lt1"/>
+      </a:fontRef>
+    </dgm:style>
+  </dgm:styleLbl>
+  <dgm:styleLbl name="asst4">
+    <dgm:scene3d>
+      <a:camera prst="orthographicFront"/>
+      <a:lightRig rig="threePt" dir="t"/>
+    </dgm:scene3d>
+    <dgm:sp3d/>
+    <dgm:txPr/>
+    <dgm:style>
+      <a:lnRef idx="2">
+        <a:scrgbClr r="0" g="0" b="0"/>
+      </a:lnRef>
+      <a:fillRef idx="1">
+        <a:scrgbClr r="0" g="0" b="0"/>
+      </a:fillRef>
+      <a:effectRef idx="0">
+        <a:scrgbClr r="0" g="0" b="0"/>
+      </a:effectRef>
+      <a:fontRef idx="minor">
+        <a:schemeClr val="lt1"/>
+      </a:fontRef>
+    </dgm:style>
+  </dgm:styleLbl>
+  <dgm:styleLbl name="parChTrans2D1">
+    <dgm:scene3d>
+      <a:camera prst="orthographicFront"/>
+      <a:lightRig rig="threePt" dir="t"/>
+    </dgm:scene3d>
+    <dgm:sp3d/>
+    <dgm:txPr/>
+    <dgm:style>
+      <a:lnRef idx="2">
+        <a:scrgbClr r="0" g="0" b="0"/>
+      </a:lnRef>
+      <a:fillRef idx="1">
+        <a:scrgbClr r="0" g="0" b="0"/>
+      </a:fillRef>
+      <a:effectRef idx="0">
+        <a:scrgbClr r="0" g="0" b="0"/>
+      </a:effectRef>
+      <a:fontRef idx="minor">
+        <a:schemeClr val="lt1"/>
+      </a:fontRef>
+    </dgm:style>
+  </dgm:styleLbl>
+  <dgm:styleLbl name="parChTrans2D2">
+    <dgm:scene3d>
+      <a:camera prst="orthographicFront"/>
+      <a:lightRig rig="threePt" dir="t"/>
+    </dgm:scene3d>
+    <dgm:sp3d/>
+    <dgm:txPr/>
+    <dgm:style>
+      <a:lnRef idx="2">
+        <a:scrgbClr r="0" g="0" b="0"/>
+      </a:lnRef>
+      <a:fillRef idx="1">
+        <a:scrgbClr r="0" g="0" b="0"/>
+      </a:fillRef>
+      <a:effectRef idx="0">
+        <a:scrgbClr r="0" g="0" b="0"/>
+      </a:effectRef>
+      <a:fontRef idx="minor">
+        <a:schemeClr val="lt1"/>
+      </a:fontRef>
+    </dgm:style>
+  </dgm:styleLbl>
+  <dgm:styleLbl name="parChTrans2D3">
+    <dgm:scene3d>
+      <a:camera prst="orthographicFront"/>
+      <a:lightRig rig="threePt" dir="t"/>
+    </dgm:scene3d>
+    <dgm:sp3d/>
+    <dgm:txPr/>
+    <dgm:style>
+      <a:lnRef idx="2">
+        <a:scrgbClr r="0" g="0" b="0"/>
+      </a:lnRef>
+      <a:fillRef idx="1">
+        <a:scrgbClr r="0" g="0" b="0"/>
+      </a:fillRef>
+      <a:effectRef idx="0">
+        <a:scrgbClr r="0" g="0" b="0"/>
+      </a:effectRef>
+      <a:fontRef idx="minor">
+        <a:schemeClr val="lt1"/>
+      </a:fontRef>
+    </dgm:style>
+  </dgm:styleLbl>
+  <dgm:styleLbl name="parChTrans2D4">
+    <dgm:scene3d>
+      <a:camera prst="orthographicFront"/>
+      <a:lightRig rig="threePt" dir="t"/>
+    </dgm:scene3d>
+    <dgm:sp3d/>
+    <dgm:txPr/>
+    <dgm:style>
+      <a:lnRef idx="2">
+        <a:scrgbClr r="0" g="0" b="0"/>
+      </a:lnRef>
+      <a:fillRef idx="1">
+        <a:scrgbClr r="0" g="0" b="0"/>
+      </a:fillRef>
+      <a:effectRef idx="0">
+        <a:scrgbClr r="0" g="0" b="0"/>
+      </a:effectRef>
+      <a:fontRef idx="minor">
+        <a:schemeClr val="lt1"/>
+      </a:fontRef>
+    </dgm:style>
+  </dgm:styleLbl>
+  <dgm:styleLbl name="parChTrans1D1">
+    <dgm:scene3d>
+      <a:camera prst="orthographicFront"/>
+      <a:lightRig rig="threePt" dir="t"/>
+    </dgm:scene3d>
+    <dgm:sp3d/>
+    <dgm:txPr/>
+    <dgm:style>
+      <a:lnRef idx="2">
+        <a:scrgbClr r="0" g="0" b="0"/>
+      </a:lnRef>
+      <a:fillRef idx="0">
+        <a:scrgbClr r="0" g="0" b="0"/>
+      </a:fillRef>
+      <a:effectRef idx="0">
+        <a:scrgbClr r="0" g="0" b="0"/>
+      </a:effectRef>
+      <a:fontRef idx="minor"/>
+    </dgm:style>
+  </dgm:styleLbl>
+  <dgm:styleLbl name="parChTrans1D2">
+    <dgm:scene3d>
+      <a:camera prst="orthographicFront"/>
+      <a:lightRig rig="threePt" dir="t"/>
+    </dgm:scene3d>
+    <dgm:sp3d/>
+    <dgm:txPr/>
+    <dgm:style>
+      <a:lnRef idx="2">
+        <a:scrgbClr r="0" g="0" b="0"/>
+      </a:lnRef>
+      <a:fillRef idx="0">
+        <a:scrgbClr r="0" g="0" b="0"/>
+      </a:fillRef>
+      <a:effectRef idx="0">
+        <a:scrgbClr r="0" g="0" b="0"/>
+      </a:effectRef>
+      <a:fontRef idx="minor"/>
+    </dgm:style>
+  </dgm:styleLbl>
+  <dgm:styleLbl name="parChTrans1D3">
+    <dgm:scene3d>
+      <a:camera prst="orthographicFront"/>
+      <a:lightRig rig="threePt" dir="t"/>
+    </dgm:scene3d>
+    <dgm:sp3d/>
+    <dgm:txPr/>
+    <dgm:style>
+      <a:lnRef idx="2">
+        <a:scrgbClr r="0" g="0" b="0"/>
+      </a:lnRef>
+      <a:fillRef idx="0">
+        <a:scrgbClr r="0" g="0" b="0"/>
+      </a:fillRef>
+      <a:effectRef idx="0">
+        <a:scrgbClr r="0" g="0" b="0"/>
+      </a:effectRef>
+      <a:fontRef idx="minor"/>
+    </dgm:style>
+  </dgm:styleLbl>
+  <dgm:styleLbl name="parChTrans1D4">
+    <dgm:scene3d>
+      <a:camera prst="orthographicFront"/>
+      <a:lightRig rig="threePt" dir="t"/>
+    </dgm:scene3d>
+    <dgm:sp3d/>
+    <dgm:txPr/>
+    <dgm:style>
+      <a:lnRef idx="2">
+        <a:scrgbClr r="0" g="0" b="0"/>
+      </a:lnRef>
+      <a:fillRef idx="0">
+        <a:scrgbClr r="0" g="0" b="0"/>
+      </a:fillRef>
+      <a:effectRef idx="0">
+        <a:scrgbClr r="0" g="0" b="0"/>
+      </a:effectRef>
+      <a:fontRef idx="minor"/>
+    </dgm:style>
+  </dgm:styleLbl>
+  <dgm:styleLbl name="fgAcc1">
+    <dgm:scene3d>
+      <a:camera prst="orthographicFront"/>
+      <a:lightRig rig="threePt" dir="t"/>
+    </dgm:scene3d>
+    <dgm:sp3d/>
+    <dgm:txPr/>
+    <dgm:style>
+      <a:lnRef idx="2">
+        <a:scrgbClr r="0" g="0" b="0"/>
+      </a:lnRef>
+      <a:fillRef idx="1">
+        <a:scrgbClr r="0" g="0" b="0"/>
+      </a:fillRef>
+      <a:effectRef idx="0">
+        <a:scrgbClr r="0" g="0" b="0"/>
+      </a:effectRef>
+      <a:fontRef idx="minor"/>
+    </dgm:style>
+  </dgm:styleLbl>
+  <dgm:styleLbl name="conFgAcc1">
+    <dgm:scene3d>
+      <a:camera prst="orthographicFront"/>
+      <a:lightRig rig="threePt" dir="t"/>
+    </dgm:scene3d>
+    <dgm:sp3d/>
+    <dgm:txPr/>
+    <dgm:style>
+      <a:lnRef idx="2">
+        <a:scrgbClr r="0" g="0" b="0"/>
+      </a:lnRef>
+      <a:fillRef idx="1">
+        <a:scrgbClr r="0" g="0" b="0"/>
+      </a:fillRef>
+      <a:effectRef idx="0">
+        <a:scrgbClr r="0" g="0" b="0"/>
+      </a:effectRef>
+      <a:fontRef idx="minor"/>
+    </dgm:style>
+  </dgm:styleLbl>
+  <dgm:styleLbl name="alignAcc1">
+    <dgm:scene3d>
+      <a:camera prst="orthographicFront"/>
+      <a:lightRig rig="threePt" dir="t"/>
+    </dgm:scene3d>
+    <dgm:sp3d/>
+    <dgm:txPr/>
+    <dgm:style>
+      <a:lnRef idx="2">
+        <a:scrgbClr r="0" g="0" b="0"/>
+      </a:lnRef>
+      <a:fillRef idx="1">
+        <a:scrgbClr r="0" g="0" b="0"/>
+      </a:fillRef>
+      <a:effectRef idx="0">
+        <a:scrgbClr r="0" g="0" b="0"/>
+      </a:effectRef>
+      <a:fontRef idx="minor"/>
+    </dgm:style>
+  </dgm:styleLbl>
+  <dgm:styleLbl name="trAlignAcc1">
+    <dgm:scene3d>
+      <a:camera prst="orthographicFront"/>
+      <a:lightRig rig="threePt" dir="t"/>
+    </dgm:scene3d>
+    <dgm:sp3d/>
+    <dgm:txPr/>
+    <dgm:style>
+      <a:lnRef idx="1">
+        <a:scrgbClr r="0" g="0" b="0"/>
+      </a:lnRef>
+      <a:fillRef idx="1">
+        <a:scrgbClr r="0" g="0" b="0"/>
+      </a:fillRef>
+      <a:effectRef idx="0">
+        <a:scrgbClr r="0" g="0" b="0"/>
+      </a:effectRef>
+      <a:fontRef idx="minor"/>
+    </dgm:style>
+  </dgm:styleLbl>
+  <dgm:styleLbl name="bgAcc1">
+    <dgm:scene3d>
+      <a:camera prst="orthographicFront"/>
+      <a:lightRig rig="threePt" dir="t"/>
+    </dgm:scene3d>
+    <dgm:sp3d/>
+    <dgm:txPr/>
+    <dgm:style>
+      <a:lnRef idx="2">
+        <a:scrgbClr r="0" g="0" b="0"/>
+      </a:lnRef>
+      <a:fillRef idx="1">
+        <a:scrgbClr r="0" g="0" b="0"/>
+      </a:fillRef>
+      <a:effectRef idx="0">
+        <a:scrgbClr r="0" g="0" b="0"/>
+      </a:effectRef>
+      <a:fontRef idx="minor"/>
+    </dgm:style>
+  </dgm:styleLbl>
+  <dgm:styleLbl name="solidFgAcc1">
+    <dgm:scene3d>
+      <a:camera prst="orthographicFront"/>
+      <a:lightRig rig="threePt" dir="t"/>
+    </dgm:scene3d>
+    <dgm:sp3d/>
+    <dgm:txPr/>
+    <dgm:style>
+      <a:lnRef idx="2">
+        <a:scrgbClr r="0" g="0" b="0"/>
+      </a:lnRef>
+      <a:fillRef idx="1">
+        <a:scrgbClr r="0" g="0" b="0"/>
+      </a:fillRef>
+      <a:effectRef idx="0">
+        <a:scrgbClr r="0" g="0" b="0"/>
+      </a:effectRef>
+      <a:fontRef idx="minor"/>
+    </dgm:style>
+  </dgm:styleLbl>
+  <dgm:styleLbl name="solidAlignAcc1">
+    <dgm:scene3d>
+      <a:camera prst="orthographicFront"/>
+      <a:lightRig rig="threePt" dir="t"/>
+    </dgm:scene3d>
+    <dgm:sp3d/>
+    <dgm:txPr/>
+    <dgm:style>
+      <a:lnRef idx="2">
+        <a:scrgbClr r="0" g="0" b="0"/>
+      </a:lnRef>
+      <a:fillRef idx="1">
+        <a:scrgbClr r="0" g="0" b="0"/>
+      </a:fillRef>
+      <a:effectRef idx="0">
+        <a:scrgbClr r="0" g="0" b="0"/>
+      </a:effectRef>
+      <a:fontRef idx="minor"/>
+    </dgm:style>
+  </dgm:styleLbl>
+  <dgm:styleLbl name="solidBgAcc1">
+    <dgm:scene3d>
+      <a:camera prst="orthographicFront"/>
+      <a:lightRig rig="threePt" dir="t"/>
+    </dgm:scene3d>
+    <dgm:sp3d/>
+    <dgm:txPr/>
+    <dgm:style>
+      <a:lnRef idx="2">
+        <a:scrgbClr r="0" g="0" b="0"/>
+      </a:lnRef>
+      <a:fillRef idx="1">
+        <a:scrgbClr r="0" g="0" b="0"/>
+      </a:fillRef>
+      <a:effectRef idx="0">
+        <a:scrgbClr r="0" g="0" b="0"/>
+      </a:effectRef>
+      <a:fontRef idx="minor"/>
+    </dgm:style>
+  </dgm:styleLbl>
+  <dgm:styleLbl name="fgAccFollowNode1">
+    <dgm:scene3d>
+      <a:camera prst="orthographicFront"/>
+      <a:lightRig rig="threePt" dir="t"/>
+    </dgm:scene3d>
+    <dgm:sp3d/>
+    <dgm:txPr/>
+    <dgm:style>
+      <a:lnRef idx="2">
+        <a:scrgbClr r="0" g="0" b="0"/>
+      </a:lnRef>
+      <a:fillRef idx="1">
+        <a:scrgbClr r="0" g="0" b="0"/>
+      </a:fillRef>
+      <a:effectRef idx="0">
+        <a:scrgbClr r="0" g="0" b="0"/>
+      </a:effectRef>
+      <a:fontRef idx="minor"/>
+    </dgm:style>
+  </dgm:styleLbl>
+  <dgm:styleLbl name="alignAccFollowNode1">
+    <dgm:scene3d>
+      <a:camera prst="orthographicFront"/>
+      <a:lightRig rig="threePt" dir="t"/>
+    </dgm:scene3d>
+    <dgm:sp3d/>
+    <dgm:txPr/>
+    <dgm:style>
+      <a:lnRef idx="2">
+        <a:scrgbClr r="0" g="0" b="0"/>
+      </a:lnRef>
+      <a:fillRef idx="1">
+        <a:scrgbClr r="0" g="0" b="0"/>
+      </a:fillRef>
+      <a:effectRef idx="0">
+        <a:scrgbClr r="0" g="0" b="0"/>
+      </a:effectRef>
+      <a:fontRef idx="minor"/>
+    </dgm:style>
+  </dgm:styleLbl>
+  <dgm:styleLbl name="bgAccFollowNode1">
+    <dgm:scene3d>
+      <a:camera prst="orthographicFront"/>
+      <a:lightRig rig="threePt" dir="t"/>
+    </dgm:scene3d>
+    <dgm:sp3d/>
+    <dgm:txPr/>
+    <dgm:style>
+      <a:lnRef idx="2">
+        <a:scrgbClr r="0" g="0" b="0"/>
+      </a:lnRef>
+      <a:fillRef idx="1">
+        <a:scrgbClr r="0" g="0" b="0"/>
+      </a:fillRef>
+      <a:effectRef idx="0">
+        <a:scrgbClr r="0" g="0" b="0"/>
+      </a:effectRef>
+      <a:fontRef idx="minor"/>
+    </dgm:style>
+  </dgm:styleLbl>
+  <dgm:styleLbl name="fgAcc0">
+    <dgm:scene3d>
+      <a:camera prst="orthographicFront"/>
+      <a:lightRig rig="threePt" dir="t"/>
+    </dgm:scene3d>
+    <dgm:sp3d/>
+    <dgm:txPr/>
+    <dgm:style>
+      <a:lnRef idx="2">
+        <a:scrgbClr r="0" g="0" b="0"/>
+      </a:lnRef>
+      <a:fillRef idx="1">
+        <a:scrgbClr r="0" g="0" b="0"/>
+      </a:fillRef>
+      <a:effectRef idx="0">
+        <a:scrgbClr r="0" g="0" b="0"/>
+      </a:effectRef>
+      <a:fontRef idx="minor"/>
+    </dgm:style>
+  </dgm:styleLbl>
+  <dgm:styleLbl name="fgAcc2">
+    <dgm:scene3d>
+      <a:camera prst="orthographicFront"/>
+      <a:lightRig rig="threePt" dir="t"/>
+    </dgm:scene3d>
+    <dgm:sp3d/>
+    <dgm:txPr/>
+    <dgm:style>
+      <a:lnRef idx="2">
+        <a:scrgbClr r="0" g="0" b="0"/>
+      </a:lnRef>
+      <a:fillRef idx="1">
+        <a:scrgbClr r="0" g="0" b="0"/>
+      </a:fillRef>
+      <a:effectRef idx="0">
+        <a:scrgbClr r="0" g="0" b="0"/>
+      </a:effectRef>
+      <a:fontRef idx="minor"/>
+    </dgm:style>
+  </dgm:styleLbl>
+  <dgm:styleLbl name="fgAcc3">
+    <dgm:scene3d>
+      <a:camera prst="orthographicFront"/>
+      <a:lightRig rig="threePt" dir="t"/>
+    </dgm:scene3d>
+    <dgm:sp3d/>
+    <dgm:txPr/>
+    <dgm:style>
+      <a:lnRef idx="2">
+        <a:scrgbClr r="0" g="0" b="0"/>
+      </a:lnRef>
+      <a:fillRef idx="1">
+        <a:scrgbClr r="0" g="0" b="0"/>
+      </a:fillRef>
+      <a:effectRef idx="0">
+        <a:scrgbClr r="0" g="0" b="0"/>
+      </a:effectRef>
+      <a:fontRef idx="minor"/>
+    </dgm:style>
+  </dgm:styleLbl>
+  <dgm:styleLbl name="fgAcc4">
+    <dgm:scene3d>
+      <a:camera prst="orthographicFront"/>
+      <a:lightRig rig="threePt" dir="t"/>
+    </dgm:scene3d>
+    <dgm:sp3d/>
+    <dgm:txPr/>
+    <dgm:style>
+      <a:lnRef idx="2">
+        <a:scrgbClr r="0" g="0" b="0"/>
+      </a:lnRef>
+      <a:fillRef idx="1">
+        <a:scrgbClr r="0" g="0" b="0"/>
+      </a:fillRef>
+      <a:effectRef idx="0">
+        <a:scrgbClr r="0" g="0" b="0"/>
+      </a:effectRef>
+      <a:fontRef idx="minor"/>
+    </dgm:style>
+  </dgm:styleLbl>
+  <dgm:styleLbl name="bgShp">
+    <dgm:scene3d>
+      <a:camera prst="orthographicFront"/>
+      <a:lightRig rig="threePt" dir="t"/>
+    </dgm:scene3d>
+    <dgm:sp3d/>
+    <dgm:txPr/>
+    <dgm:style>
+      <a:lnRef idx="0">
+        <a:scrgbClr r="0" g="0" b="0"/>
+      </a:lnRef>
+      <a:fillRef idx="1">
+        <a:scrgbClr r="0" g="0" b="0"/>
+      </a:fillRef>
+      <a:effectRef idx="0">
+        <a:scrgbClr r="0" g="0" b="0"/>
+      </a:effectRef>
+      <a:fontRef idx="minor"/>
+    </dgm:style>
+  </dgm:styleLbl>
+  <dgm:styleLbl name="dkBgShp">
+    <dgm:scene3d>
+      <a:camera prst="orthographicFront"/>
+      <a:lightRig rig="threePt" dir="t"/>
+    </dgm:scene3d>
+    <dgm:sp3d/>
+    <dgm:txPr/>
+    <dgm:style>
+      <a:lnRef idx="0">
+        <a:scrgbClr r="0" g="0" b="0"/>
+      </a:lnRef>
+      <a:fillRef idx="1">
+        <a:scrgbClr r="0" g="0" b="0"/>
+      </a:fillRef>
+      <a:effectRef idx="0">
+        <a:scrgbClr r="0" g="0" b="0"/>
+      </a:effectRef>
+      <a:fontRef idx="minor"/>
+    </dgm:style>
+  </dgm:styleLbl>
+  <dgm:styleLbl name="trBgShp">
+    <dgm:scene3d>
+      <a:camera prst="orthographicFront"/>
+      <a:lightRig rig="threePt" dir="t"/>
+    </dgm:scene3d>
+    <dgm:sp3d/>
+    <dgm:txPr/>
+    <dgm:style>
+      <a:lnRef idx="0">
+        <a:scrgbClr r="0" g="0" b="0"/>
+      </a:lnRef>
+      <a:fillRef idx="1">
+        <a:scrgbClr r="0" g="0" b="0"/>
+      </a:fillRef>
+      <a:effectRef idx="0">
+        <a:scrgbClr r="0" g="0" b="0"/>
+      </a:effectRef>
+      <a:fontRef idx="minor"/>
+    </dgm:style>
+  </dgm:styleLbl>
+  <dgm:styleLbl name="fgShp">
+    <dgm:scene3d>
+      <a:camera prst="orthographicFront"/>
+      <a:lightRig rig="threePt" dir="t"/>
+    </dgm:scene3d>
+    <dgm:sp3d/>
+    <dgm:txPr/>
+    <dgm:style>
+      <a:lnRef idx="2">
+        <a:scrgbClr r="0" g="0" b="0"/>
+      </a:lnRef>
+      <a:fillRef idx="1">
+        <a:scrgbClr r="0" g="0" b="0"/>
+      </a:fillRef>
+      <a:effectRef idx="0">
+        <a:scrgbClr r="0" g="0" b="0"/>
+      </a:effectRef>
+      <a:fontRef idx="minor"/>
+    </dgm:style>
+  </dgm:styleLbl>
+  <dgm:styleLbl name="revTx">
+    <dgm:scene3d>
+      <a:camera prst="orthographicFront"/>
+      <a:lightRig rig="threePt" dir="t"/>
+    </dgm:scene3d>
+    <dgm:sp3d/>
+    <dgm:txPr/>
+    <dgm:style>
+      <a:lnRef idx="0">
+        <a:scrgbClr r="0" g="0" b="0"/>
+      </a:lnRef>
+      <a:fillRef idx="0">
+        <a:scrgbClr r="0" g="0" b="0"/>
+      </a:fillRef>
+      <a:effectRef idx="0">
+        <a:scrgbClr r="0" g="0" b="0"/>
+      </a:effectRef>
+      <a:fontRef idx="minor"/>
+    </dgm:style>
+  </dgm:styleLbl>
+</dgm:styleDef>
+</file>
+
+<file path=ppt/diagrams/quickStyle2.xml><?xml version="1.0" encoding="utf-8"?>
 <dgm:styleDef xmlns:dgm="http://schemas.openxmlformats.org/drawingml/2006/diagram" xmlns:a="http://schemas.openxmlformats.org/drawingml/2006/main" uniqueId="urn:microsoft.com/office/officeart/2005/8/quickstyle/simple1">
   <dgm:title val=""/>
   <dgm:desc val=""/>
@@ -4079,7 +6944,7 @@
           <a:p>
             <a:fld id="{7BEC3FA6-102E-40AC-A840-653D5C60A4AF}" type="datetimeFigureOut">
               <a:rPr lang="fr-FR" smtClean="0"/>
-              <a:t>30/08/2018</a:t>
+              <a:t>10/09/2019</a:t>
             </a:fld>
             <a:endParaRPr lang="fr-FR"/>
           </a:p>
@@ -4249,7 +7114,7 @@
           <a:p>
             <a:fld id="{7BEC3FA6-102E-40AC-A840-653D5C60A4AF}" type="datetimeFigureOut">
               <a:rPr lang="fr-FR" smtClean="0"/>
-              <a:t>30/08/2018</a:t>
+              <a:t>10/09/2019</a:t>
             </a:fld>
             <a:endParaRPr lang="fr-FR"/>
           </a:p>
@@ -4429,7 +7294,7 @@
           <a:p>
             <a:fld id="{7BEC3FA6-102E-40AC-A840-653D5C60A4AF}" type="datetimeFigureOut">
               <a:rPr lang="fr-FR" smtClean="0"/>
-              <a:t>30/08/2018</a:t>
+              <a:t>10/09/2019</a:t>
             </a:fld>
             <a:endParaRPr lang="fr-FR"/>
           </a:p>
@@ -4599,7 +7464,7 @@
           <a:p>
             <a:fld id="{7BEC3FA6-102E-40AC-A840-653D5C60A4AF}" type="datetimeFigureOut">
               <a:rPr lang="fr-FR" smtClean="0"/>
-              <a:t>30/08/2018</a:t>
+              <a:t>10/09/2019</a:t>
             </a:fld>
             <a:endParaRPr lang="fr-FR"/>
           </a:p>
@@ -4845,7 +7710,7 @@
           <a:p>
             <a:fld id="{7BEC3FA6-102E-40AC-A840-653D5C60A4AF}" type="datetimeFigureOut">
               <a:rPr lang="fr-FR" smtClean="0"/>
-              <a:t>30/08/2018</a:t>
+              <a:t>10/09/2019</a:t>
             </a:fld>
             <a:endParaRPr lang="fr-FR"/>
           </a:p>
@@ -5077,7 +7942,7 @@
           <a:p>
             <a:fld id="{7BEC3FA6-102E-40AC-A840-653D5C60A4AF}" type="datetimeFigureOut">
               <a:rPr lang="fr-FR" smtClean="0"/>
-              <a:t>30/08/2018</a:t>
+              <a:t>10/09/2019</a:t>
             </a:fld>
             <a:endParaRPr lang="fr-FR"/>
           </a:p>
@@ -5444,7 +8309,7 @@
           <a:p>
             <a:fld id="{7BEC3FA6-102E-40AC-A840-653D5C60A4AF}" type="datetimeFigureOut">
               <a:rPr lang="fr-FR" smtClean="0"/>
-              <a:t>30/08/2018</a:t>
+              <a:t>10/09/2019</a:t>
             </a:fld>
             <a:endParaRPr lang="fr-FR"/>
           </a:p>
@@ -5562,7 +8427,7 @@
           <a:p>
             <a:fld id="{7BEC3FA6-102E-40AC-A840-653D5C60A4AF}" type="datetimeFigureOut">
               <a:rPr lang="fr-FR" smtClean="0"/>
-              <a:t>30/08/2018</a:t>
+              <a:t>10/09/2019</a:t>
             </a:fld>
             <a:endParaRPr lang="fr-FR"/>
           </a:p>
@@ -5657,7 +8522,7 @@
           <a:p>
             <a:fld id="{7BEC3FA6-102E-40AC-A840-653D5C60A4AF}" type="datetimeFigureOut">
               <a:rPr lang="fr-FR" smtClean="0"/>
-              <a:t>30/08/2018</a:t>
+              <a:t>10/09/2019</a:t>
             </a:fld>
             <a:endParaRPr lang="fr-FR"/>
           </a:p>
@@ -5934,7 +8799,7 @@
           <a:p>
             <a:fld id="{7BEC3FA6-102E-40AC-A840-653D5C60A4AF}" type="datetimeFigureOut">
               <a:rPr lang="fr-FR" smtClean="0"/>
-              <a:t>30/08/2018</a:t>
+              <a:t>10/09/2019</a:t>
             </a:fld>
             <a:endParaRPr lang="fr-FR"/>
           </a:p>
@@ -6191,7 +9056,7 @@
           <a:p>
             <a:fld id="{7BEC3FA6-102E-40AC-A840-653D5C60A4AF}" type="datetimeFigureOut">
               <a:rPr lang="fr-FR" smtClean="0"/>
-              <a:t>30/08/2018</a:t>
+              <a:t>10/09/2019</a:t>
             </a:fld>
             <a:endParaRPr lang="fr-FR"/>
           </a:p>
@@ -6404,7 +9269,7 @@
           <a:p>
             <a:fld id="{7BEC3FA6-102E-40AC-A840-653D5C60A4AF}" type="datetimeFigureOut">
               <a:rPr lang="fr-FR" smtClean="0"/>
-              <a:t>30/08/2018</a:t>
+              <a:t>10/09/2019</a:t>
             </a:fld>
             <a:endParaRPr lang="fr-FR"/>
           </a:p>
@@ -7594,6 +10459,985 @@
 </p:sld>
 </file>
 
+<file path=ppt/slides/slide2.xml><?xml version="1.0" encoding="utf-8"?>
+<p:sld xmlns:a="http://schemas.openxmlformats.org/drawingml/2006/main" xmlns:r="http://schemas.openxmlformats.org/officeDocument/2006/relationships" xmlns:p="http://schemas.openxmlformats.org/presentationml/2006/main">
+  <p:cSld>
+    <p:spTree>
+      <p:nvGrpSpPr>
+        <p:cNvPr id="1" name=""/>
+        <p:cNvGrpSpPr/>
+        <p:nvPr/>
+      </p:nvGrpSpPr>
+      <p:grpSpPr>
+        <a:xfrm>
+          <a:off x="0" y="0"/>
+          <a:ext cx="0" cy="0"/>
+          <a:chOff x="0" y="0"/>
+          <a:chExt cx="0" cy="0"/>
+        </a:xfrm>
+      </p:grpSpPr>
+      <p:grpSp>
+        <p:nvGrpSpPr>
+          <p:cNvPr id="2" name="Groupe 1"/>
+          <p:cNvGrpSpPr/>
+          <p:nvPr/>
+        </p:nvGrpSpPr>
+        <p:grpSpPr>
+          <a:xfrm>
+            <a:off x="500614" y="282584"/>
+            <a:ext cx="8918446" cy="3575031"/>
+            <a:chOff x="500614" y="282584"/>
+            <a:chExt cx="8918446" cy="3575031"/>
+          </a:xfrm>
+        </p:grpSpPr>
+        <p:grpSp>
+          <p:nvGrpSpPr>
+            <p:cNvPr id="16" name="Groupe 15">
+              <a:extLst>
+                <a:ext uri="{FF2B5EF4-FFF2-40B4-BE49-F238E27FC236}">
+                  <a16:creationId xmlns:a16="http://schemas.microsoft.com/office/drawing/2014/main" id="{76E187D9-02AB-4025-BB39-699CFEC0ECDE}"/>
+                </a:ext>
+              </a:extLst>
+            </p:cNvPr>
+            <p:cNvGrpSpPr/>
+            <p:nvPr/>
+          </p:nvGrpSpPr>
+          <p:grpSpPr>
+            <a:xfrm>
+              <a:off x="500614" y="282584"/>
+              <a:ext cx="8904772" cy="3575031"/>
+              <a:chOff x="500614" y="211386"/>
+              <a:chExt cx="8904772" cy="3575031"/>
+            </a:xfrm>
+          </p:grpSpPr>
+          <p:graphicFrame>
+            <p:nvGraphicFramePr>
+              <p:cNvPr id="32" name="Diagramme 31">
+                <a:extLst>
+                  <a:ext uri="{FF2B5EF4-FFF2-40B4-BE49-F238E27FC236}">
+                    <a16:creationId xmlns:a16="http://schemas.microsoft.com/office/drawing/2014/main" id="{DAC960D5-BFA9-418E-8885-9E5D8BCBE8F6}"/>
+                  </a:ext>
+                </a:extLst>
+              </p:cNvPr>
+              <p:cNvGraphicFramePr>
+                <a:graphicFrameLocks noChangeAspect="1"/>
+              </p:cNvGraphicFramePr>
+              <p:nvPr>
+                <p:extLst/>
+              </p:nvPr>
+            </p:nvGraphicFramePr>
+            <p:xfrm>
+              <a:off x="500614" y="244674"/>
+              <a:ext cx="8904772" cy="3150524"/>
+            </p:xfrm>
+            <a:graphic>
+              <a:graphicData uri="http://schemas.openxmlformats.org/drawingml/2006/diagram">
+                <dgm:relIds xmlns:dgm="http://schemas.openxmlformats.org/drawingml/2006/diagram" xmlns:r="http://schemas.openxmlformats.org/officeDocument/2006/relationships" r:dm="rId2" r:lo="rId3" r:qs="rId4" r:cs="rId5"/>
+              </a:graphicData>
+            </a:graphic>
+          </p:graphicFrame>
+          <p:sp>
+            <p:nvSpPr>
+              <p:cNvPr id="5" name="ZoneTexte 4">
+                <a:extLst>
+                  <a:ext uri="{FF2B5EF4-FFF2-40B4-BE49-F238E27FC236}">
+                    <a16:creationId xmlns:a16="http://schemas.microsoft.com/office/drawing/2014/main" id="{E1284C5D-0DA9-40EF-97F0-6A72B17A5392}"/>
+                  </a:ext>
+                </a:extLst>
+              </p:cNvPr>
+              <p:cNvSpPr txBox="1"/>
+              <p:nvPr/>
+            </p:nvSpPr>
+            <p:spPr>
+              <a:xfrm>
+                <a:off x="4397175" y="1715720"/>
+                <a:ext cx="1234415" cy="307777"/>
+              </a:xfrm>
+              <a:prstGeom prst="rect">
+                <a:avLst/>
+              </a:prstGeom>
+              <a:noFill/>
+            </p:spPr>
+            <p:txBody>
+              <a:bodyPr wrap="square" rtlCol="0">
+                <a:spAutoFit/>
+              </a:bodyPr>
+              <a:lstStyle/>
+              <a:p>
+                <a:r>
+                  <a:rPr lang="fr-FR" sz="1400" dirty="0">
+                    <a:latin typeface="Times New Roman" panose="02020603050405020304" pitchFamily="18" charset="0"/>
+                    <a:cs typeface="Times New Roman" panose="02020603050405020304" pitchFamily="18" charset="0"/>
+                  </a:rPr>
+                  <a:t>Test the model</a:t>
+                </a:r>
+              </a:p>
+            </p:txBody>
+          </p:sp>
+          <p:sp>
+            <p:nvSpPr>
+              <p:cNvPr id="4" name="ZoneTexte 3">
+                <a:extLst>
+                  <a:ext uri="{FF2B5EF4-FFF2-40B4-BE49-F238E27FC236}">
+                    <a16:creationId xmlns:a16="http://schemas.microsoft.com/office/drawing/2014/main" id="{A6F3B6F5-7125-4307-9623-F8B6FD367AE0}"/>
+                  </a:ext>
+                </a:extLst>
+              </p:cNvPr>
+              <p:cNvSpPr txBox="1"/>
+              <p:nvPr/>
+            </p:nvSpPr>
+            <p:spPr>
+              <a:xfrm>
+                <a:off x="694023" y="1607992"/>
+                <a:ext cx="1774823" cy="523220"/>
+              </a:xfrm>
+              <a:prstGeom prst="rect">
+                <a:avLst/>
+              </a:prstGeom>
+              <a:noFill/>
+            </p:spPr>
+            <p:txBody>
+              <a:bodyPr wrap="square" rtlCol="0">
+                <a:spAutoFit/>
+              </a:bodyPr>
+              <a:lstStyle/>
+              <a:p>
+                <a:pPr algn="ctr"/>
+                <a:r>
+                  <a:rPr lang="fr-FR" sz="1400" dirty="0">
+                    <a:latin typeface="Times New Roman" panose="02020603050405020304" pitchFamily="18" charset="0"/>
+                    <a:cs typeface="Times New Roman" panose="02020603050405020304" pitchFamily="18" charset="0"/>
+                  </a:rPr>
+                  <a:t>Write / </a:t>
+                </a:r>
+                <a:r>
+                  <a:rPr lang="fr-FR" sz="1400" dirty="0" err="1">
+                    <a:latin typeface="Times New Roman" panose="02020603050405020304" pitchFamily="18" charset="0"/>
+                    <a:cs typeface="Times New Roman" panose="02020603050405020304" pitchFamily="18" charset="0"/>
+                  </a:rPr>
+                  <a:t>add</a:t>
+                </a:r>
+                <a:r>
+                  <a:rPr lang="fr-FR" sz="1400" dirty="0">
+                    <a:latin typeface="Times New Roman" panose="02020603050405020304" pitchFamily="18" charset="0"/>
+                    <a:cs typeface="Times New Roman" panose="02020603050405020304" pitchFamily="18" charset="0"/>
+                  </a:rPr>
+                  <a:t> </a:t>
+                </a:r>
+                <a:r>
+                  <a:rPr lang="fr-FR" sz="1400" dirty="0" err="1">
+                    <a:latin typeface="Times New Roman" panose="02020603050405020304" pitchFamily="18" charset="0"/>
+                    <a:cs typeface="Times New Roman" panose="02020603050405020304" pitchFamily="18" charset="0"/>
+                  </a:rPr>
+                  <a:t>parameter</a:t>
+                </a:r>
+                <a:r>
+                  <a:rPr lang="fr-FR" sz="1400" dirty="0">
+                    <a:latin typeface="Times New Roman" panose="02020603050405020304" pitchFamily="18" charset="0"/>
+                    <a:cs typeface="Times New Roman" panose="02020603050405020304" pitchFamily="18" charset="0"/>
+                  </a:rPr>
+                  <a:t> </a:t>
+                </a:r>
+              </a:p>
+              <a:p>
+                <a:pPr algn="ctr"/>
+                <a:r>
+                  <a:rPr lang="fr-FR" sz="1400" dirty="0">
+                    <a:latin typeface="Times New Roman" panose="02020603050405020304" pitchFamily="18" charset="0"/>
+                    <a:cs typeface="Times New Roman" panose="02020603050405020304" pitchFamily="18" charset="0"/>
+                  </a:rPr>
+                  <a:t>Change </a:t>
+                </a:r>
+                <a:r>
+                  <a:rPr lang="fr-FR" sz="1400" dirty="0" err="1">
+                    <a:latin typeface="Times New Roman" panose="02020603050405020304" pitchFamily="18" charset="0"/>
+                    <a:cs typeface="Times New Roman" panose="02020603050405020304" pitchFamily="18" charset="0"/>
+                  </a:rPr>
+                  <a:t>formalism</a:t>
+                </a:r>
+                <a:endParaRPr lang="fr-FR" sz="1400" dirty="0">
+                  <a:latin typeface="Times New Roman" panose="02020603050405020304" pitchFamily="18" charset="0"/>
+                  <a:cs typeface="Times New Roman" panose="02020603050405020304" pitchFamily="18" charset="0"/>
+                </a:endParaRPr>
+              </a:p>
+            </p:txBody>
+          </p:sp>
+          <p:sp>
+            <p:nvSpPr>
+              <p:cNvPr id="6" name="ZoneTexte 5">
+                <a:extLst>
+                  <a:ext uri="{FF2B5EF4-FFF2-40B4-BE49-F238E27FC236}">
+                    <a16:creationId xmlns:a16="http://schemas.microsoft.com/office/drawing/2014/main" id="{5B5A2A77-55E4-43CE-8D19-0E594790CC04}"/>
+                  </a:ext>
+                </a:extLst>
+              </p:cNvPr>
+              <p:cNvSpPr txBox="1"/>
+              <p:nvPr/>
+            </p:nvSpPr>
+            <p:spPr>
+              <a:xfrm>
+                <a:off x="7559909" y="1607988"/>
+                <a:ext cx="1601096" cy="523220"/>
+              </a:xfrm>
+              <a:prstGeom prst="rect">
+                <a:avLst/>
+              </a:prstGeom>
+              <a:noFill/>
+            </p:spPr>
+            <p:txBody>
+              <a:bodyPr wrap="square" rtlCol="0">
+                <a:spAutoFit/>
+              </a:bodyPr>
+              <a:lstStyle/>
+              <a:p>
+                <a:r>
+                  <a:rPr lang="fr-FR" sz="1400" dirty="0" err="1">
+                    <a:latin typeface="Times New Roman" panose="02020603050405020304" pitchFamily="18" charset="0"/>
+                    <a:cs typeface="Times New Roman" panose="02020603050405020304" pitchFamily="18" charset="0"/>
+                  </a:rPr>
+                  <a:t>Evaluate</a:t>
+                </a:r>
+                <a:r>
+                  <a:rPr lang="fr-FR" sz="1400" dirty="0">
+                    <a:latin typeface="Times New Roman" panose="02020603050405020304" pitchFamily="18" charset="0"/>
+                    <a:cs typeface="Times New Roman" panose="02020603050405020304" pitchFamily="18" charset="0"/>
+                  </a:rPr>
+                  <a:t> the model </a:t>
+                </a:r>
+              </a:p>
+              <a:p>
+                <a:r>
+                  <a:rPr lang="fr-FR" sz="1400" dirty="0" err="1">
+                    <a:latin typeface="Times New Roman" panose="02020603050405020304" pitchFamily="18" charset="0"/>
+                    <a:cs typeface="Times New Roman" panose="02020603050405020304" pitchFamily="18" charset="0"/>
+                  </a:rPr>
+                  <a:t>using</a:t>
+                </a:r>
+                <a:r>
+                  <a:rPr lang="fr-FR" sz="1400" dirty="0">
+                    <a:latin typeface="Times New Roman" panose="02020603050405020304" pitchFamily="18" charset="0"/>
+                    <a:cs typeface="Times New Roman" panose="02020603050405020304" pitchFamily="18" charset="0"/>
+                  </a:rPr>
+                  <a:t> observations</a:t>
+                </a:r>
+              </a:p>
+            </p:txBody>
+          </p:sp>
+          <p:sp>
+            <p:nvSpPr>
+              <p:cNvPr id="18" name="Rectangle : coins arrondis 17">
+                <a:extLst>
+                  <a:ext uri="{FF2B5EF4-FFF2-40B4-BE49-F238E27FC236}">
+                    <a16:creationId xmlns:a16="http://schemas.microsoft.com/office/drawing/2014/main" id="{434EB259-9607-4EA5-B485-A9406CB9AF8E}"/>
+                  </a:ext>
+                </a:extLst>
+              </p:cNvPr>
+              <p:cNvSpPr/>
+              <p:nvPr/>
+            </p:nvSpPr>
+            <p:spPr>
+              <a:xfrm>
+                <a:off x="986563" y="2112528"/>
+                <a:ext cx="975692" cy="288000"/>
+              </a:xfrm>
+              <a:prstGeom prst="roundRect">
+                <a:avLst/>
+              </a:prstGeom>
+              <a:solidFill>
+                <a:srgbClr val="F5F5F5"/>
+              </a:solidFill>
+              <a:ln>
+                <a:noFill/>
+              </a:ln>
+            </p:spPr>
+            <p:style>
+              <a:lnRef idx="2">
+                <a:schemeClr val="accent1">
+                  <a:shade val="50000"/>
+                </a:schemeClr>
+              </a:lnRef>
+              <a:fillRef idx="1">
+                <a:schemeClr val="accent1"/>
+              </a:fillRef>
+              <a:effectRef idx="0">
+                <a:schemeClr val="accent1"/>
+              </a:effectRef>
+              <a:fontRef idx="minor">
+                <a:schemeClr val="lt1"/>
+              </a:fontRef>
+            </p:style>
+            <p:txBody>
+              <a:bodyPr rtlCol="0" anchor="ctr"/>
+              <a:lstStyle/>
+              <a:p>
+                <a:pPr algn="ctr"/>
+                <a:r>
+                  <a:rPr lang="fr-FR" sz="1200" dirty="0" err="1">
+                    <a:solidFill>
+                      <a:srgbClr val="3D2E2D"/>
+                    </a:solidFill>
+                    <a:latin typeface="Consolas" panose="020B0609020204030204" pitchFamily="49" charset="0"/>
+                    <a:ea typeface="Verdana" panose="020B0604030504040204" pitchFamily="34" charset="0"/>
+                    <a:cs typeface="Times New Roman" panose="02020603050405020304" pitchFamily="18" charset="0"/>
+                  </a:rPr>
+                  <a:t>set_param</a:t>
+                </a:r>
+                <a:endParaRPr lang="fr-FR" sz="1400" dirty="0">
+                  <a:solidFill>
+                    <a:srgbClr val="3D2E2D"/>
+                  </a:solidFill>
+                  <a:latin typeface="Times New Roman" panose="02020603050405020304" pitchFamily="18" charset="0"/>
+                  <a:cs typeface="Times New Roman" panose="02020603050405020304" pitchFamily="18" charset="0"/>
+                </a:endParaRPr>
+              </a:p>
+            </p:txBody>
+          </p:sp>
+          <p:cxnSp>
+            <p:nvCxnSpPr>
+              <p:cNvPr id="20" name="Connecteur droit avec flèche 19">
+                <a:extLst>
+                  <a:ext uri="{FF2B5EF4-FFF2-40B4-BE49-F238E27FC236}">
+                    <a16:creationId xmlns:a16="http://schemas.microsoft.com/office/drawing/2014/main" id="{C5ACC639-B2BB-4BDD-A6D8-C042AF1F728D}"/>
+                  </a:ext>
+                </a:extLst>
+              </p:cNvPr>
+              <p:cNvCxnSpPr>
+                <a:cxnSpLocks/>
+              </p:cNvCxnSpPr>
+              <p:nvPr/>
+            </p:nvCxnSpPr>
+            <p:spPr>
+              <a:xfrm>
+                <a:off x="8339244" y="2526402"/>
+                <a:ext cx="3" cy="634345"/>
+              </a:xfrm>
+              <a:prstGeom prst="straightConnector1">
+                <a:avLst/>
+              </a:prstGeom>
+              <a:ln>
+                <a:tailEnd type="triangle"/>
+              </a:ln>
+            </p:spPr>
+            <p:style>
+              <a:lnRef idx="1">
+                <a:schemeClr val="dk1"/>
+              </a:lnRef>
+              <a:fillRef idx="0">
+                <a:schemeClr val="dk1"/>
+              </a:fillRef>
+              <a:effectRef idx="0">
+                <a:schemeClr val="dk1"/>
+              </a:effectRef>
+              <a:fontRef idx="minor">
+                <a:schemeClr val="tx1"/>
+              </a:fontRef>
+            </p:style>
+          </p:cxnSp>
+          <p:sp>
+            <p:nvSpPr>
+              <p:cNvPr id="21" name="ZoneTexte 20">
+                <a:extLst>
+                  <a:ext uri="{FF2B5EF4-FFF2-40B4-BE49-F238E27FC236}">
+                    <a16:creationId xmlns:a16="http://schemas.microsoft.com/office/drawing/2014/main" id="{43373C3D-8663-45B3-8191-AC158A61B0A2}"/>
+                  </a:ext>
+                </a:extLst>
+              </p:cNvPr>
+              <p:cNvSpPr txBox="1"/>
+              <p:nvPr/>
+            </p:nvSpPr>
+            <p:spPr>
+              <a:xfrm>
+                <a:off x="7544822" y="3201029"/>
+                <a:ext cx="1616191" cy="307777"/>
+              </a:xfrm>
+              <a:prstGeom prst="rect">
+                <a:avLst/>
+              </a:prstGeom>
+              <a:noFill/>
+            </p:spPr>
+            <p:txBody>
+              <a:bodyPr wrap="square" rtlCol="0">
+                <a:spAutoFit/>
+              </a:bodyPr>
+              <a:lstStyle/>
+              <a:p>
+                <a:r>
+                  <a:rPr lang="fr-FR" sz="1400" dirty="0" err="1">
+                    <a:latin typeface="Times New Roman" panose="02020603050405020304" pitchFamily="18" charset="0"/>
+                    <a:cs typeface="Times New Roman" panose="02020603050405020304" pitchFamily="18" charset="0"/>
+                  </a:rPr>
+                  <a:t>Sensitivity</a:t>
+                </a:r>
+                <a:r>
+                  <a:rPr lang="fr-FR" sz="1400" dirty="0">
+                    <a:latin typeface="Times New Roman" panose="02020603050405020304" pitchFamily="18" charset="0"/>
+                    <a:cs typeface="Times New Roman" panose="02020603050405020304" pitchFamily="18" charset="0"/>
+                  </a:rPr>
+                  <a:t> analyses</a:t>
+                </a:r>
+              </a:p>
+            </p:txBody>
+          </p:sp>
+          <p:sp>
+            <p:nvSpPr>
+              <p:cNvPr id="33" name="Rectangle : coins arrondis 32">
+                <a:extLst>
+                  <a:ext uri="{FF2B5EF4-FFF2-40B4-BE49-F238E27FC236}">
+                    <a16:creationId xmlns:a16="http://schemas.microsoft.com/office/drawing/2014/main" id="{A60C2F39-4816-4EAF-AB58-7849C17A65F4}"/>
+                  </a:ext>
+                </a:extLst>
+              </p:cNvPr>
+              <p:cNvSpPr/>
+              <p:nvPr/>
+            </p:nvSpPr>
+            <p:spPr>
+              <a:xfrm>
+                <a:off x="7815563" y="2150484"/>
+                <a:ext cx="1080000" cy="288000"/>
+              </a:xfrm>
+              <a:prstGeom prst="roundRect">
+                <a:avLst/>
+              </a:prstGeom>
+              <a:solidFill>
+                <a:srgbClr val="F5F5F5"/>
+              </a:solidFill>
+              <a:ln>
+                <a:noFill/>
+              </a:ln>
+            </p:spPr>
+            <p:style>
+              <a:lnRef idx="2">
+                <a:schemeClr val="accent1">
+                  <a:shade val="50000"/>
+                </a:schemeClr>
+              </a:lnRef>
+              <a:fillRef idx="1">
+                <a:schemeClr val="accent1"/>
+              </a:fillRef>
+              <a:effectRef idx="0">
+                <a:schemeClr val="accent1"/>
+              </a:effectRef>
+              <a:fontRef idx="minor">
+                <a:schemeClr val="lt1"/>
+              </a:fontRef>
+            </p:style>
+            <p:txBody>
+              <a:bodyPr rtlCol="0" anchor="ctr"/>
+              <a:lstStyle/>
+              <a:p>
+                <a:pPr algn="ctr"/>
+                <a:r>
+                  <a:rPr lang="fr-FR" sz="1200" dirty="0" err="1">
+                    <a:solidFill>
+                      <a:srgbClr val="3D2E2D"/>
+                    </a:solidFill>
+                    <a:latin typeface="Consolas" panose="020B0609020204030204" pitchFamily="49" charset="0"/>
+                    <a:ea typeface="Verdana" panose="020B0604030504040204" pitchFamily="34" charset="0"/>
+                    <a:cs typeface="Times New Roman" panose="02020603050405020304" pitchFamily="18" charset="0"/>
+                  </a:rPr>
+                  <a:t>stics_eval</a:t>
+                </a:r>
+                <a:endParaRPr lang="fr-FR" sz="1400" dirty="0">
+                  <a:solidFill>
+                    <a:srgbClr val="3D2E2D"/>
+                  </a:solidFill>
+                  <a:latin typeface="Times New Roman" panose="02020603050405020304" pitchFamily="18" charset="0"/>
+                  <a:cs typeface="Times New Roman" panose="02020603050405020304" pitchFamily="18" charset="0"/>
+                </a:endParaRPr>
+              </a:p>
+            </p:txBody>
+          </p:sp>
+          <p:sp>
+            <p:nvSpPr>
+              <p:cNvPr id="34" name="Rectangle : coins arrondis 33">
+                <a:extLst>
+                  <a:ext uri="{FF2B5EF4-FFF2-40B4-BE49-F238E27FC236}">
+                    <a16:creationId xmlns:a16="http://schemas.microsoft.com/office/drawing/2014/main" id="{1E457DA4-7D40-4FE2-AE85-5BF786D8B9C9}"/>
+                  </a:ext>
+                </a:extLst>
+              </p:cNvPr>
+              <p:cNvSpPr/>
+              <p:nvPr/>
+            </p:nvSpPr>
+            <p:spPr>
+              <a:xfrm>
+                <a:off x="7614908" y="3498417"/>
+                <a:ext cx="1476000" cy="288000"/>
+              </a:xfrm>
+              <a:prstGeom prst="roundRect">
+                <a:avLst/>
+              </a:prstGeom>
+              <a:solidFill>
+                <a:srgbClr val="F5F5F5"/>
+              </a:solidFill>
+              <a:ln>
+                <a:noFill/>
+              </a:ln>
+            </p:spPr>
+            <p:style>
+              <a:lnRef idx="2">
+                <a:schemeClr val="accent1">
+                  <a:shade val="50000"/>
+                </a:schemeClr>
+              </a:lnRef>
+              <a:fillRef idx="1">
+                <a:schemeClr val="accent1"/>
+              </a:fillRef>
+              <a:effectRef idx="0">
+                <a:schemeClr val="accent1"/>
+              </a:effectRef>
+              <a:fontRef idx="minor">
+                <a:schemeClr val="lt1"/>
+              </a:fontRef>
+            </p:style>
+            <p:txBody>
+              <a:bodyPr rtlCol="0" anchor="ctr"/>
+              <a:lstStyle/>
+              <a:p>
+                <a:pPr algn="ctr"/>
+                <a:r>
+                  <a:rPr lang="fr-FR" sz="1200" dirty="0" err="1">
+                    <a:solidFill>
+                      <a:srgbClr val="3D2E2D"/>
+                    </a:solidFill>
+                    <a:latin typeface="Consolas" panose="020B0609020204030204" pitchFamily="49" charset="0"/>
+                    <a:ea typeface="Verdana" panose="020B0604030504040204" pitchFamily="34" charset="0"/>
+                    <a:cs typeface="Times New Roman" panose="02020603050405020304" pitchFamily="18" charset="0"/>
+                  </a:rPr>
+                  <a:t>sensitive_stics</a:t>
+                </a:r>
+                <a:endParaRPr lang="fr-FR" sz="1400" dirty="0">
+                  <a:solidFill>
+                    <a:srgbClr val="3D2E2D"/>
+                  </a:solidFill>
+                  <a:latin typeface="Times New Roman" panose="02020603050405020304" pitchFamily="18" charset="0"/>
+                  <a:cs typeface="Times New Roman" panose="02020603050405020304" pitchFamily="18" charset="0"/>
+                </a:endParaRPr>
+              </a:p>
+            </p:txBody>
+          </p:sp>
+          <p:sp>
+            <p:nvSpPr>
+              <p:cNvPr id="35" name="ZoneTexte 34">
+                <a:extLst>
+                  <a:ext uri="{FF2B5EF4-FFF2-40B4-BE49-F238E27FC236}">
+                    <a16:creationId xmlns:a16="http://schemas.microsoft.com/office/drawing/2014/main" id="{CE0AB163-8B8C-417B-8E2F-3ADEC859C431}"/>
+                  </a:ext>
+                </a:extLst>
+              </p:cNvPr>
+              <p:cNvSpPr txBox="1"/>
+              <p:nvPr/>
+            </p:nvSpPr>
+            <p:spPr>
+              <a:xfrm>
+                <a:off x="759816" y="211386"/>
+                <a:ext cx="1429184" cy="307777"/>
+              </a:xfrm>
+              <a:prstGeom prst="rect">
+                <a:avLst/>
+              </a:prstGeom>
+              <a:noFill/>
+            </p:spPr>
+            <p:txBody>
+              <a:bodyPr wrap="square" rtlCol="0">
+                <a:spAutoFit/>
+              </a:bodyPr>
+              <a:lstStyle/>
+              <a:p>
+                <a:r>
+                  <a:rPr lang="fr-FR" sz="1400" dirty="0">
+                    <a:latin typeface="Times New Roman" panose="02020603050405020304" pitchFamily="18" charset="0"/>
+                    <a:cs typeface="Times New Roman" panose="02020603050405020304" pitchFamily="18" charset="0"/>
+                  </a:rPr>
+                  <a:t>Read a </a:t>
+                </a:r>
+                <a:r>
+                  <a:rPr lang="fr-FR" sz="1400" dirty="0" err="1">
+                    <a:latin typeface="Times New Roman" panose="02020603050405020304" pitchFamily="18" charset="0"/>
+                    <a:cs typeface="Times New Roman" panose="02020603050405020304" pitchFamily="18" charset="0"/>
+                  </a:rPr>
+                  <a:t>parameter</a:t>
+                </a:r>
+                <a:endParaRPr lang="fr-FR" sz="1400" dirty="0">
+                  <a:latin typeface="Times New Roman" panose="02020603050405020304" pitchFamily="18" charset="0"/>
+                  <a:cs typeface="Times New Roman" panose="02020603050405020304" pitchFamily="18" charset="0"/>
+                </a:endParaRPr>
+              </a:p>
+            </p:txBody>
+          </p:sp>
+          <p:sp>
+            <p:nvSpPr>
+              <p:cNvPr id="41" name="Rectangle : coins arrondis 40">
+                <a:extLst>
+                  <a:ext uri="{FF2B5EF4-FFF2-40B4-BE49-F238E27FC236}">
+                    <a16:creationId xmlns:a16="http://schemas.microsoft.com/office/drawing/2014/main" id="{F9E60878-B9D2-48F2-9183-67150CE73DC0}"/>
+                  </a:ext>
+                </a:extLst>
+              </p:cNvPr>
+              <p:cNvSpPr/>
+              <p:nvPr/>
+            </p:nvSpPr>
+            <p:spPr>
+              <a:xfrm>
+                <a:off x="918436" y="521024"/>
+                <a:ext cx="1111947" cy="288953"/>
+              </a:xfrm>
+              <a:prstGeom prst="roundRect">
+                <a:avLst/>
+              </a:prstGeom>
+              <a:solidFill>
+                <a:srgbClr val="F5F5F5"/>
+              </a:solidFill>
+              <a:ln>
+                <a:noFill/>
+              </a:ln>
+            </p:spPr>
+            <p:style>
+              <a:lnRef idx="2">
+                <a:schemeClr val="accent1">
+                  <a:shade val="50000"/>
+                </a:schemeClr>
+              </a:lnRef>
+              <a:fillRef idx="1">
+                <a:schemeClr val="accent1"/>
+              </a:fillRef>
+              <a:effectRef idx="0">
+                <a:schemeClr val="accent1"/>
+              </a:effectRef>
+              <a:fontRef idx="minor">
+                <a:schemeClr val="lt1"/>
+              </a:fontRef>
+            </p:style>
+            <p:txBody>
+              <a:bodyPr rtlCol="0" anchor="ctr"/>
+              <a:lstStyle/>
+              <a:p>
+                <a:pPr algn="ctr"/>
+                <a:r>
+                  <a:rPr lang="fr-FR" sz="1200" dirty="0" err="1">
+                    <a:solidFill>
+                      <a:srgbClr val="3D2E2D"/>
+                    </a:solidFill>
+                    <a:latin typeface="Consolas" panose="020B0609020204030204" pitchFamily="49" charset="0"/>
+                    <a:ea typeface="Verdana" panose="020B0604030504040204" pitchFamily="34" charset="0"/>
+                    <a:cs typeface="Times New Roman" panose="02020603050405020304" pitchFamily="18" charset="0"/>
+                  </a:rPr>
+                  <a:t>read_param</a:t>
+                </a:r>
+                <a:endParaRPr lang="fr-FR" sz="1400" dirty="0">
+                  <a:solidFill>
+                    <a:srgbClr val="3D2E2D"/>
+                  </a:solidFill>
+                  <a:latin typeface="Times New Roman" panose="02020603050405020304" pitchFamily="18" charset="0"/>
+                  <a:cs typeface="Times New Roman" panose="02020603050405020304" pitchFamily="18" charset="0"/>
+                </a:endParaRPr>
+              </a:p>
+            </p:txBody>
+          </p:sp>
+          <p:cxnSp>
+            <p:nvCxnSpPr>
+              <p:cNvPr id="24" name="Connecteur droit avec flèche 23">
+                <a:extLst>
+                  <a:ext uri="{FF2B5EF4-FFF2-40B4-BE49-F238E27FC236}">
+                    <a16:creationId xmlns:a16="http://schemas.microsoft.com/office/drawing/2014/main" id="{84855C08-8E37-4CE3-B09E-7C3AFF6C276D}"/>
+                  </a:ext>
+                </a:extLst>
+              </p:cNvPr>
+              <p:cNvCxnSpPr>
+                <a:cxnSpLocks/>
+              </p:cNvCxnSpPr>
+              <p:nvPr/>
+            </p:nvCxnSpPr>
+            <p:spPr>
+              <a:xfrm rot="5400000">
+                <a:off x="1137727" y="1212574"/>
+                <a:ext cx="673368" cy="3"/>
+              </a:xfrm>
+              <a:prstGeom prst="straightConnector1">
+                <a:avLst/>
+              </a:prstGeom>
+              <a:ln>
+                <a:tailEnd type="triangle"/>
+              </a:ln>
+            </p:spPr>
+            <p:style>
+              <a:lnRef idx="1">
+                <a:schemeClr val="dk1"/>
+              </a:lnRef>
+              <a:fillRef idx="0">
+                <a:schemeClr val="dk1"/>
+              </a:fillRef>
+              <a:effectRef idx="0">
+                <a:schemeClr val="dk1"/>
+              </a:effectRef>
+              <a:fontRef idx="minor">
+                <a:schemeClr val="tx1"/>
+              </a:fontRef>
+            </p:style>
+          </p:cxnSp>
+          <p:cxnSp>
+            <p:nvCxnSpPr>
+              <p:cNvPr id="30" name="Connecteur droit avec flèche 29">
+                <a:extLst>
+                  <a:ext uri="{FF2B5EF4-FFF2-40B4-BE49-F238E27FC236}">
+                    <a16:creationId xmlns:a16="http://schemas.microsoft.com/office/drawing/2014/main" id="{AB284213-CE63-468B-9B6A-B1FF24F53778}"/>
+                  </a:ext>
+                </a:extLst>
+              </p:cNvPr>
+              <p:cNvCxnSpPr>
+                <a:cxnSpLocks/>
+              </p:cNvCxnSpPr>
+              <p:nvPr/>
+            </p:nvCxnSpPr>
+            <p:spPr>
+              <a:xfrm rot="16200000">
+                <a:off x="7145537" y="1572246"/>
+                <a:ext cx="3" cy="634345"/>
+              </a:xfrm>
+              <a:prstGeom prst="straightConnector1">
+                <a:avLst/>
+              </a:prstGeom>
+              <a:ln>
+                <a:tailEnd type="triangle"/>
+              </a:ln>
+            </p:spPr>
+            <p:style>
+              <a:lnRef idx="1">
+                <a:schemeClr val="dk1"/>
+              </a:lnRef>
+              <a:fillRef idx="0">
+                <a:schemeClr val="dk1"/>
+              </a:fillRef>
+              <a:effectRef idx="0">
+                <a:schemeClr val="dk1"/>
+              </a:effectRef>
+              <a:fontRef idx="minor">
+                <a:schemeClr val="tx1"/>
+              </a:fontRef>
+            </p:style>
+          </p:cxnSp>
+          <p:cxnSp>
+            <p:nvCxnSpPr>
+              <p:cNvPr id="31" name="Connecteur droit avec flèche 30">
+                <a:extLst>
+                  <a:ext uri="{FF2B5EF4-FFF2-40B4-BE49-F238E27FC236}">
+                    <a16:creationId xmlns:a16="http://schemas.microsoft.com/office/drawing/2014/main" id="{59F39702-795C-4ED3-AAB6-EFCC0EF60D87}"/>
+                  </a:ext>
+                </a:extLst>
+              </p:cNvPr>
+              <p:cNvCxnSpPr>
+                <a:cxnSpLocks/>
+              </p:cNvCxnSpPr>
+              <p:nvPr/>
+            </p:nvCxnSpPr>
+            <p:spPr>
+              <a:xfrm rot="16200000">
+                <a:off x="2883224" y="1552437"/>
+                <a:ext cx="3" cy="634345"/>
+              </a:xfrm>
+              <a:prstGeom prst="straightConnector1">
+                <a:avLst/>
+              </a:prstGeom>
+              <a:ln>
+                <a:tailEnd type="triangle"/>
+              </a:ln>
+            </p:spPr>
+            <p:style>
+              <a:lnRef idx="1">
+                <a:schemeClr val="dk1"/>
+              </a:lnRef>
+              <a:fillRef idx="0">
+                <a:schemeClr val="dk1"/>
+              </a:fillRef>
+              <a:effectRef idx="0">
+                <a:schemeClr val="dk1"/>
+              </a:effectRef>
+              <a:fontRef idx="minor">
+                <a:schemeClr val="tx1"/>
+              </a:fontRef>
+            </p:style>
+          </p:cxnSp>
+        </p:grpSp>
+        <p:cxnSp>
+          <p:nvCxnSpPr>
+            <p:cNvPr id="17" name="Connecteur droit avec flèche 16">
+              <a:extLst>
+                <a:ext uri="{FF2B5EF4-FFF2-40B4-BE49-F238E27FC236}">
+                  <a16:creationId xmlns:a16="http://schemas.microsoft.com/office/drawing/2014/main" id="{C5ACC639-B2BB-4BDD-A6D8-C042AF1F728D}"/>
+                </a:ext>
+              </a:extLst>
+            </p:cNvPr>
+            <p:cNvCxnSpPr>
+              <a:cxnSpLocks/>
+            </p:cNvCxnSpPr>
+            <p:nvPr/>
+          </p:nvCxnSpPr>
+          <p:spPr>
+            <a:xfrm rot="10800000">
+              <a:off x="8338615" y="1038814"/>
+              <a:ext cx="3" cy="634345"/>
+            </a:xfrm>
+            <a:prstGeom prst="straightConnector1">
+              <a:avLst/>
+            </a:prstGeom>
+            <a:ln>
+              <a:tailEnd type="triangle"/>
+            </a:ln>
+          </p:spPr>
+          <p:style>
+            <a:lnRef idx="1">
+              <a:schemeClr val="dk1"/>
+            </a:lnRef>
+            <a:fillRef idx="0">
+              <a:schemeClr val="dk1"/>
+            </a:fillRef>
+            <a:effectRef idx="0">
+              <a:schemeClr val="dk1"/>
+            </a:effectRef>
+            <a:fontRef idx="minor">
+              <a:schemeClr val="tx1"/>
+            </a:fontRef>
+          </p:style>
+        </p:cxnSp>
+        <p:sp>
+          <p:nvSpPr>
+            <p:cNvPr id="19" name="ZoneTexte 18">
+              <a:extLst>
+                <a:ext uri="{FF2B5EF4-FFF2-40B4-BE49-F238E27FC236}">
+                  <a16:creationId xmlns:a16="http://schemas.microsoft.com/office/drawing/2014/main" id="{43373C3D-8663-45B3-8191-AC158A61B0A2}"/>
+                </a:ext>
+              </a:extLst>
+            </p:cNvPr>
+            <p:cNvSpPr txBox="1"/>
+            <p:nvPr/>
+          </p:nvSpPr>
+          <p:spPr>
+            <a:xfrm>
+              <a:off x="7544822" y="309845"/>
+              <a:ext cx="1874238" cy="307777"/>
+            </a:xfrm>
+            <a:prstGeom prst="rect">
+              <a:avLst/>
+            </a:prstGeom>
+            <a:noFill/>
+          </p:spPr>
+          <p:txBody>
+            <a:bodyPr wrap="square" rtlCol="0">
+              <a:spAutoFit/>
+            </a:bodyPr>
+            <a:lstStyle/>
+            <a:p>
+              <a:r>
+                <a:rPr lang="fr-FR" sz="1400" dirty="0" err="1" smtClean="0">
+                  <a:latin typeface="Times New Roman" panose="02020603050405020304" pitchFamily="18" charset="0"/>
+                  <a:cs typeface="Times New Roman" panose="02020603050405020304" pitchFamily="18" charset="0"/>
+                </a:rPr>
+                <a:t>Parameter</a:t>
+              </a:r>
+              <a:r>
+                <a:rPr lang="fr-FR" sz="1400" dirty="0" smtClean="0">
+                  <a:latin typeface="Times New Roman" panose="02020603050405020304" pitchFamily="18" charset="0"/>
+                  <a:cs typeface="Times New Roman" panose="02020603050405020304" pitchFamily="18" charset="0"/>
+                </a:rPr>
+                <a:t> </a:t>
+              </a:r>
+              <a:r>
+                <a:rPr lang="fr-FR" sz="1400" dirty="0" err="1" smtClean="0">
+                  <a:latin typeface="Times New Roman" panose="02020603050405020304" pitchFamily="18" charset="0"/>
+                  <a:cs typeface="Times New Roman" panose="02020603050405020304" pitchFamily="18" charset="0"/>
+                </a:rPr>
+                <a:t>optimization</a:t>
+              </a:r>
+              <a:endParaRPr lang="fr-FR" sz="1400" dirty="0">
+                <a:latin typeface="Times New Roman" panose="02020603050405020304" pitchFamily="18" charset="0"/>
+                <a:cs typeface="Times New Roman" panose="02020603050405020304" pitchFamily="18" charset="0"/>
+              </a:endParaRPr>
+            </a:p>
+          </p:txBody>
+        </p:sp>
+        <p:sp>
+          <p:nvSpPr>
+            <p:cNvPr id="22" name="Rectangle : coins arrondis 33">
+              <a:extLst>
+                <a:ext uri="{FF2B5EF4-FFF2-40B4-BE49-F238E27FC236}">
+                  <a16:creationId xmlns:a16="http://schemas.microsoft.com/office/drawing/2014/main" id="{1E457DA4-7D40-4FE2-AE85-5BF786D8B9C9}"/>
+                </a:ext>
+              </a:extLst>
+            </p:cNvPr>
+            <p:cNvSpPr/>
+            <p:nvPr/>
+          </p:nvSpPr>
+          <p:spPr>
+            <a:xfrm>
+              <a:off x="7614908" y="593175"/>
+              <a:ext cx="1476000" cy="288000"/>
+            </a:xfrm>
+            <a:prstGeom prst="roundRect">
+              <a:avLst/>
+            </a:prstGeom>
+            <a:solidFill>
+              <a:srgbClr val="F5F5F5"/>
+            </a:solidFill>
+            <a:ln>
+              <a:noFill/>
+            </a:ln>
+          </p:spPr>
+          <p:style>
+            <a:lnRef idx="2">
+              <a:schemeClr val="accent1">
+                <a:shade val="50000"/>
+              </a:schemeClr>
+            </a:lnRef>
+            <a:fillRef idx="1">
+              <a:schemeClr val="accent1"/>
+            </a:fillRef>
+            <a:effectRef idx="0">
+              <a:schemeClr val="accent1"/>
+            </a:effectRef>
+            <a:fontRef idx="minor">
+              <a:schemeClr val="lt1"/>
+            </a:fontRef>
+          </p:style>
+          <p:txBody>
+            <a:bodyPr rtlCol="0" anchor="ctr"/>
+            <a:lstStyle/>
+            <a:p>
+              <a:pPr algn="ctr"/>
+              <a:r>
+                <a:rPr lang="fr-FR" sz="1200" dirty="0" err="1" smtClean="0">
+                  <a:solidFill>
+                    <a:srgbClr val="3D2E2D"/>
+                  </a:solidFill>
+                  <a:latin typeface="Consolas" panose="020B0609020204030204" pitchFamily="49" charset="0"/>
+                  <a:ea typeface="Verdana" panose="020B0604030504040204" pitchFamily="34" charset="0"/>
+                  <a:cs typeface="Times New Roman" panose="02020603050405020304" pitchFamily="18" charset="0"/>
+                </a:rPr>
+                <a:t>optimi_stics</a:t>
+              </a:r>
+              <a:endParaRPr lang="fr-FR" sz="1400" dirty="0">
+                <a:solidFill>
+                  <a:srgbClr val="3D2E2D"/>
+                </a:solidFill>
+                <a:latin typeface="Times New Roman" panose="02020603050405020304" pitchFamily="18" charset="0"/>
+                <a:cs typeface="Times New Roman" panose="02020603050405020304" pitchFamily="18" charset="0"/>
+              </a:endParaRPr>
+            </a:p>
+          </p:txBody>
+        </p:sp>
+      </p:grpSp>
+    </p:spTree>
+    <p:extLst>
+      <p:ext uri="{BB962C8B-B14F-4D97-AF65-F5344CB8AC3E}">
+        <p14:creationId xmlns:p14="http://schemas.microsoft.com/office/powerpoint/2010/main" val="1480401255"/>
+      </p:ext>
+    </p:extLst>
+  </p:cSld>
+  <p:clrMapOvr>
+    <a:masterClrMapping/>
+  </p:clrMapOvr>
+</p:sld>
+</file>
+
 <file path=ppt/theme/theme1.xml><?xml version="1.0" encoding="utf-8"?>
 <a:theme xmlns:a="http://schemas.openxmlformats.org/drawingml/2006/main" name="Thème Office">
   <a:themeElements>

</xml_diff>